<commit_message>
reference fasta to bed
</commit_message>
<xml_diff>
--- a/short_genetic_variants/docs/short_indels.pptx
+++ b/short_genetic_variants/docs/short_indels.pptx
@@ -4270,6 +4270,681 @@
           </a:p>
         </p:txBody>
       </p:sp>
+      <p:sp>
+        <p:nvSpPr>
+          <p:cNvPr id="3" name="TextBox 2">
+            <a:extLst>
+              <a:ext uri="{FF2B5EF4-FFF2-40B4-BE49-F238E27FC236}">
+                <a16:creationId xmlns:a16="http://schemas.microsoft.com/office/drawing/2014/main" id="{6AF45C4C-3E49-344D-9302-96B66F645438}"/>
+              </a:ext>
+            </a:extLst>
+          </p:cNvPr>
+          <p:cNvSpPr txBox="1"/>
+          <p:nvPr/>
+        </p:nvSpPr>
+        <p:spPr>
+          <a:xfrm>
+            <a:off x="648183" y="2129742"/>
+            <a:ext cx="2426818" cy="369332"/>
+          </a:xfrm>
+          <a:prstGeom prst="rect">
+            <a:avLst/>
+          </a:prstGeom>
+          <a:noFill/>
+        </p:spPr>
+        <p:txBody>
+          <a:bodyPr wrap="none" rtlCol="0">
+            <a:spAutoFit/>
+          </a:bodyPr>
+          <a:lstStyle/>
+          <a:p>
+            <a:r>
+              <a:rPr lang="en-GB" dirty="0"/>
+              <a:t>Density of total markers</a:t>
+            </a:r>
+          </a:p>
+        </p:txBody>
+      </p:sp>
+      <p:sp>
+        <p:nvSpPr>
+          <p:cNvPr id="4" name="TextBox 3">
+            <a:extLst>
+              <a:ext uri="{FF2B5EF4-FFF2-40B4-BE49-F238E27FC236}">
+                <a16:creationId xmlns:a16="http://schemas.microsoft.com/office/drawing/2014/main" id="{716A47BA-6494-014A-8D52-66C78C05ABA1}"/>
+              </a:ext>
+            </a:extLst>
+          </p:cNvPr>
+          <p:cNvSpPr txBox="1"/>
+          <p:nvPr/>
+        </p:nvSpPr>
+        <p:spPr>
+          <a:xfrm>
+            <a:off x="3705829" y="2129742"/>
+            <a:ext cx="2667590" cy="369332"/>
+          </a:xfrm>
+          <a:prstGeom prst="rect">
+            <a:avLst/>
+          </a:prstGeom>
+          <a:noFill/>
+        </p:spPr>
+        <p:txBody>
+          <a:bodyPr wrap="none" rtlCol="0">
+            <a:spAutoFit/>
+          </a:bodyPr>
+          <a:lstStyle/>
+          <a:p>
+            <a:r>
+              <a:rPr lang="en-GB" dirty="0"/>
+              <a:t>Density of neutral markers</a:t>
+            </a:r>
+          </a:p>
+        </p:txBody>
+      </p:sp>
+      <p:sp>
+        <p:nvSpPr>
+          <p:cNvPr id="5" name="TextBox 4">
+            <a:extLst>
+              <a:ext uri="{FF2B5EF4-FFF2-40B4-BE49-F238E27FC236}">
+                <a16:creationId xmlns:a16="http://schemas.microsoft.com/office/drawing/2014/main" id="{74924E8F-9EB0-8848-8E8D-76305B227B64}"/>
+              </a:ext>
+            </a:extLst>
+          </p:cNvPr>
+          <p:cNvSpPr txBox="1"/>
+          <p:nvPr/>
+        </p:nvSpPr>
+        <p:spPr>
+          <a:xfrm>
+            <a:off x="6763475" y="2129742"/>
+            <a:ext cx="2614627" cy="369332"/>
+          </a:xfrm>
+          <a:prstGeom prst="rect">
+            <a:avLst/>
+          </a:prstGeom>
+          <a:noFill/>
+        </p:spPr>
+        <p:txBody>
+          <a:bodyPr wrap="none" rtlCol="0">
+            <a:spAutoFit/>
+          </a:bodyPr>
+          <a:lstStyle/>
+          <a:p>
+            <a:r>
+              <a:rPr lang="en-GB" dirty="0"/>
+              <a:t>Density of outlier markers</a:t>
+            </a:r>
+          </a:p>
+        </p:txBody>
+      </p:sp>
+      <mc:AlternateContent xmlns:mc="http://schemas.openxmlformats.org/markup-compatibility/2006">
+        <mc:Choice xmlns:a14="http://schemas.microsoft.com/office/drawing/2010/main" Requires="a14">
+          <p:sp>
+            <p:nvSpPr>
+              <p:cNvPr id="6" name="TextBox 5">
+                <a:extLst>
+                  <a:ext uri="{FF2B5EF4-FFF2-40B4-BE49-F238E27FC236}">
+                    <a16:creationId xmlns:a16="http://schemas.microsoft.com/office/drawing/2014/main" id="{C40B11A4-C5E2-4444-913B-7E300347554F}"/>
+                  </a:ext>
+                </a:extLst>
+              </p:cNvPr>
+              <p:cNvSpPr txBox="1"/>
+              <p:nvPr/>
+            </p:nvSpPr>
+            <p:spPr>
+              <a:xfrm>
+                <a:off x="648183" y="893633"/>
+                <a:ext cx="250966" cy="521233"/>
+              </a:xfrm>
+              <a:prstGeom prst="rect">
+                <a:avLst/>
+              </a:prstGeom>
+              <a:noFill/>
+            </p:spPr>
+            <p:txBody>
+              <a:bodyPr wrap="none" lIns="0" tIns="0" rIns="0" bIns="0" rtlCol="0">
+                <a:spAutoFit/>
+              </a:bodyPr>
+              <a:lstStyle/>
+              <a:p>
+                <a14:m>
+                  <m:oMathPara xmlns:m="http://schemas.openxmlformats.org/officeDocument/2006/math">
+                    <m:oMathParaPr>
+                      <m:jc m:val="centerGroup"/>
+                    </m:oMathParaPr>
+                    <m:oMath xmlns:m="http://schemas.openxmlformats.org/officeDocument/2006/math">
+                      <m:f>
+                        <m:fPr>
+                          <m:ctrlPr>
+                            <a:rPr lang="en-GB" i="1" smtClean="0">
+                              <a:latin typeface="Cambria Math" panose="02040503050406030204" pitchFamily="18" charset="0"/>
+                            </a:rPr>
+                          </m:ctrlPr>
+                        </m:fPr>
+                        <m:num>
+                          <m:sSub>
+                            <m:sSubPr>
+                              <m:ctrlPr>
+                                <a:rPr lang="en-GB" i="1" smtClean="0">
+                                  <a:latin typeface="Cambria Math" panose="02040503050406030204" pitchFamily="18" charset="0"/>
+                                </a:rPr>
+                              </m:ctrlPr>
+                            </m:sSubPr>
+                            <m:e>
+                              <m:r>
+                                <a:rPr lang="sv-SE" b="0" i="1" smtClean="0">
+                                  <a:latin typeface="Cambria Math" panose="02040503050406030204" pitchFamily="18" charset="0"/>
+                                </a:rPr>
+                                <m:t>𝑥</m:t>
+                              </m:r>
+                            </m:e>
+                            <m:sub>
+                              <m:r>
+                                <a:rPr lang="sv-SE" b="0" i="1" smtClean="0">
+                                  <a:latin typeface="Cambria Math" panose="02040503050406030204" pitchFamily="18" charset="0"/>
+                                </a:rPr>
+                                <m:t>𝑖</m:t>
+                              </m:r>
+                            </m:sub>
+                          </m:sSub>
+                        </m:num>
+                        <m:den>
+                          <m:sSub>
+                            <m:sSubPr>
+                              <m:ctrlPr>
+                                <a:rPr lang="en-GB" i="1" smtClean="0">
+                                  <a:latin typeface="Cambria Math" panose="02040503050406030204" pitchFamily="18" charset="0"/>
+                                </a:rPr>
+                              </m:ctrlPr>
+                            </m:sSubPr>
+                            <m:e>
+                              <m:r>
+                                <a:rPr lang="sv-SE" b="0" i="1" smtClean="0">
+                                  <a:latin typeface="Cambria Math" panose="02040503050406030204" pitchFamily="18" charset="0"/>
+                                </a:rPr>
+                                <m:t>𝐿</m:t>
+                              </m:r>
+                            </m:e>
+                            <m:sub>
+                              <m:r>
+                                <a:rPr lang="sv-SE" b="0" i="1" smtClean="0">
+                                  <a:latin typeface="Cambria Math" panose="02040503050406030204" pitchFamily="18" charset="0"/>
+                                </a:rPr>
+                                <m:t>𝑖</m:t>
+                              </m:r>
+                            </m:sub>
+                          </m:sSub>
+                        </m:den>
+                      </m:f>
+                    </m:oMath>
+                  </m:oMathPara>
+                </a14:m>
+                <a:endParaRPr lang="en-GB" dirty="0"/>
+              </a:p>
+            </p:txBody>
+          </p:sp>
+        </mc:Choice>
+        <mc:Fallback>
+          <p:sp>
+            <p:nvSpPr>
+              <p:cNvPr id="6" name="TextBox 5">
+                <a:extLst>
+                  <a:ext uri="{FF2B5EF4-FFF2-40B4-BE49-F238E27FC236}">
+                    <a16:creationId xmlns:a16="http://schemas.microsoft.com/office/drawing/2014/main" id="{C40B11A4-C5E2-4444-913B-7E300347554F}"/>
+                  </a:ext>
+                </a:extLst>
+              </p:cNvPr>
+              <p:cNvSpPr txBox="1">
+                <a:spLocks noRot="1" noChangeAspect="1" noMove="1" noResize="1" noEditPoints="1" noAdjustHandles="1" noChangeArrowheads="1" noChangeShapeType="1" noTextEdit="1"/>
+              </p:cNvSpPr>
+              <p:nvPr/>
+            </p:nvSpPr>
+            <p:spPr>
+              <a:xfrm>
+                <a:off x="648183" y="893633"/>
+                <a:ext cx="250966" cy="521233"/>
+              </a:xfrm>
+              <a:prstGeom prst="rect">
+                <a:avLst/>
+              </a:prstGeom>
+              <a:blipFill>
+                <a:blip r:embed="rId2"/>
+                <a:stretch>
+                  <a:fillRect l="-14286" r="-4762" b="-9524"/>
+                </a:stretch>
+              </a:blipFill>
+            </p:spPr>
+            <p:txBody>
+              <a:bodyPr/>
+              <a:lstStyle/>
+              <a:p>
+                <a:r>
+                  <a:rPr lang="en-GB">
+                    <a:noFill/>
+                  </a:rPr>
+                  <a:t> </a:t>
+                </a:r>
+              </a:p>
+            </p:txBody>
+          </p:sp>
+        </mc:Fallback>
+      </mc:AlternateContent>
+      <mc:AlternateContent xmlns:mc="http://schemas.openxmlformats.org/markup-compatibility/2006">
+        <mc:Choice xmlns:a14="http://schemas.microsoft.com/office/drawing/2010/main" Requires="a14">
+          <p:sp>
+            <p:nvSpPr>
+              <p:cNvPr id="7" name="TextBox 6">
+                <a:extLst>
+                  <a:ext uri="{FF2B5EF4-FFF2-40B4-BE49-F238E27FC236}">
+                    <a16:creationId xmlns:a16="http://schemas.microsoft.com/office/drawing/2014/main" id="{B0082A03-EA58-CA4D-8F3E-8226862CB7E3}"/>
+                  </a:ext>
+                </a:extLst>
+              </p:cNvPr>
+              <p:cNvSpPr txBox="1"/>
+              <p:nvPr/>
+            </p:nvSpPr>
+            <p:spPr>
+              <a:xfrm>
+                <a:off x="1374727" y="840220"/>
+                <a:ext cx="1700274" cy="525978"/>
+              </a:xfrm>
+              <a:prstGeom prst="rect">
+                <a:avLst/>
+              </a:prstGeom>
+              <a:noFill/>
+            </p:spPr>
+            <p:txBody>
+              <a:bodyPr wrap="none" lIns="0" tIns="0" rIns="0" bIns="0" rtlCol="0">
+                <a:spAutoFit/>
+              </a:bodyPr>
+              <a:lstStyle/>
+              <a:p>
+                <a14:m>
+                  <m:oMathPara xmlns:m="http://schemas.openxmlformats.org/officeDocument/2006/math">
+                    <m:oMathParaPr>
+                      <m:jc m:val="centerGroup"/>
+                    </m:oMathParaPr>
+                    <m:oMath xmlns:m="http://schemas.openxmlformats.org/officeDocument/2006/math">
+                      <m:sSub>
+                        <m:sSubPr>
+                          <m:ctrlPr>
+                            <a:rPr lang="sv-SE" b="0" i="1" smtClean="0">
+                              <a:latin typeface="Cambria Math" panose="02040503050406030204" pitchFamily="18" charset="0"/>
+                            </a:rPr>
+                          </m:ctrlPr>
+                        </m:sSubPr>
+                        <m:e>
+                          <m:r>
+                            <a:rPr lang="sv-SE" b="0" i="1" smtClean="0">
+                              <a:latin typeface="Cambria Math" panose="02040503050406030204" pitchFamily="18" charset="0"/>
+                            </a:rPr>
+                            <m:t>𝑥</m:t>
+                          </m:r>
+                        </m:e>
+                        <m:sub>
+                          <m:r>
+                            <a:rPr lang="sv-SE" b="0" i="1" smtClean="0">
+                              <a:latin typeface="Cambria Math" panose="02040503050406030204" pitchFamily="18" charset="0"/>
+                            </a:rPr>
+                            <m:t>𝑖</m:t>
+                          </m:r>
+                        </m:sub>
+                      </m:sSub>
+                      <m:r>
+                        <a:rPr lang="sv-SE" b="0" i="1" smtClean="0">
+                          <a:latin typeface="Cambria Math" panose="02040503050406030204" pitchFamily="18" charset="0"/>
+                        </a:rPr>
+                        <m:t>=</m:t>
+                      </m:r>
+                      <m:f>
+                        <m:fPr>
+                          <m:ctrlPr>
+                            <a:rPr lang="sv-SE" b="0" i="1" smtClean="0">
+                              <a:latin typeface="Cambria Math" panose="02040503050406030204" pitchFamily="18" charset="0"/>
+                            </a:rPr>
+                          </m:ctrlPr>
+                        </m:fPr>
+                        <m:num>
+                          <m:sSub>
+                            <m:sSubPr>
+                              <m:ctrlPr>
+                                <a:rPr lang="sv-SE" b="0" i="1" smtClean="0">
+                                  <a:latin typeface="Cambria Math" panose="02040503050406030204" pitchFamily="18" charset="0"/>
+                                </a:rPr>
+                              </m:ctrlPr>
+                            </m:sSubPr>
+                            <m:e>
+                              <m:r>
+                                <a:rPr lang="sv-SE" b="0" i="1" smtClean="0">
+                                  <a:latin typeface="Cambria Math" panose="02040503050406030204" pitchFamily="18" charset="0"/>
+                                </a:rPr>
+                                <m:t>𝑛</m:t>
+                              </m:r>
+                            </m:e>
+                            <m:sub>
+                              <m:r>
+                                <a:rPr lang="sv-SE" b="0" i="1" smtClean="0">
+                                  <a:latin typeface="Cambria Math" panose="02040503050406030204" pitchFamily="18" charset="0"/>
+                                </a:rPr>
+                                <m:t>𝑖</m:t>
+                              </m:r>
+                            </m:sub>
+                          </m:sSub>
+                          <m:r>
+                            <a:rPr lang="sv-SE" b="0" i="1" smtClean="0">
+                              <a:latin typeface="Cambria Math" panose="02040503050406030204" pitchFamily="18" charset="0"/>
+                            </a:rPr>
+                            <m:t> </m:t>
+                          </m:r>
+                          <m:r>
+                            <a:rPr lang="sv-SE" b="0" i="1" smtClean="0">
+                              <a:latin typeface="Cambria Math" panose="02040503050406030204" pitchFamily="18" charset="0"/>
+                            </a:rPr>
+                            <m:t>𝑚𝑎𝑟𝑘𝑒𝑟𝑠</m:t>
+                          </m:r>
+                        </m:num>
+                        <m:den>
+                          <m:r>
+                            <a:rPr lang="sv-SE" b="0" i="1" smtClean="0">
+                              <a:latin typeface="Cambria Math" panose="02040503050406030204" pitchFamily="18" charset="0"/>
+                            </a:rPr>
+                            <m:t>𝑁</m:t>
+                          </m:r>
+                          <m:r>
+                            <a:rPr lang="sv-SE" b="0" i="1" smtClean="0">
+                              <a:latin typeface="Cambria Math" panose="02040503050406030204" pitchFamily="18" charset="0"/>
+                            </a:rPr>
+                            <m:t> </m:t>
+                          </m:r>
+                          <m:r>
+                            <a:rPr lang="sv-SE" b="0" i="1" smtClean="0">
+                              <a:latin typeface="Cambria Math" panose="02040503050406030204" pitchFamily="18" charset="0"/>
+                            </a:rPr>
+                            <m:t>𝑚𝑎𝑟𝑘𝑒𝑟𝑠</m:t>
+                          </m:r>
+                        </m:den>
+                      </m:f>
+                    </m:oMath>
+                  </m:oMathPara>
+                </a14:m>
+                <a:endParaRPr lang="en-GB" dirty="0"/>
+              </a:p>
+            </p:txBody>
+          </p:sp>
+        </mc:Choice>
+        <mc:Fallback>
+          <p:sp>
+            <p:nvSpPr>
+              <p:cNvPr id="7" name="TextBox 6">
+                <a:extLst>
+                  <a:ext uri="{FF2B5EF4-FFF2-40B4-BE49-F238E27FC236}">
+                    <a16:creationId xmlns:a16="http://schemas.microsoft.com/office/drawing/2014/main" id="{B0082A03-EA58-CA4D-8F3E-8226862CB7E3}"/>
+                  </a:ext>
+                </a:extLst>
+              </p:cNvPr>
+              <p:cNvSpPr txBox="1">
+                <a:spLocks noRot="1" noChangeAspect="1" noMove="1" noResize="1" noEditPoints="1" noAdjustHandles="1" noChangeArrowheads="1" noChangeShapeType="1" noTextEdit="1"/>
+              </p:cNvSpPr>
+              <p:nvPr/>
+            </p:nvSpPr>
+            <p:spPr>
+              <a:xfrm>
+                <a:off x="1374727" y="840220"/>
+                <a:ext cx="1700274" cy="525978"/>
+              </a:xfrm>
+              <a:prstGeom prst="rect">
+                <a:avLst/>
+              </a:prstGeom>
+              <a:blipFill>
+                <a:blip r:embed="rId3"/>
+                <a:stretch>
+                  <a:fillRect l="-1493" t="-6977" r="-2239" b="-27907"/>
+                </a:stretch>
+              </a:blipFill>
+            </p:spPr>
+            <p:txBody>
+              <a:bodyPr/>
+              <a:lstStyle/>
+              <a:p>
+                <a:r>
+                  <a:rPr lang="en-GB">
+                    <a:noFill/>
+                  </a:rPr>
+                  <a:t> </a:t>
+                </a:r>
+              </a:p>
+            </p:txBody>
+          </p:sp>
+        </mc:Fallback>
+      </mc:AlternateContent>
+      <mc:AlternateContent xmlns:mc="http://schemas.openxmlformats.org/markup-compatibility/2006">
+        <mc:Choice xmlns:a14="http://schemas.microsoft.com/office/drawing/2010/main" Requires="a14">
+          <p:sp>
+            <p:nvSpPr>
+              <p:cNvPr id="8" name="TextBox 7">
+                <a:extLst>
+                  <a:ext uri="{FF2B5EF4-FFF2-40B4-BE49-F238E27FC236}">
+                    <a16:creationId xmlns:a16="http://schemas.microsoft.com/office/drawing/2014/main" id="{DCFA5F45-635D-8040-B09D-4BB9E939B896}"/>
+                  </a:ext>
+                </a:extLst>
+              </p:cNvPr>
+              <p:cNvSpPr txBox="1"/>
+              <p:nvPr/>
+            </p:nvSpPr>
+            <p:spPr>
+              <a:xfrm>
+                <a:off x="3272378" y="964709"/>
+                <a:ext cx="6202082" cy="276999"/>
+              </a:xfrm>
+              <a:prstGeom prst="rect">
+                <a:avLst/>
+              </a:prstGeom>
+              <a:noFill/>
+            </p:spPr>
+            <p:txBody>
+              <a:bodyPr wrap="none" lIns="0" tIns="0" rIns="0" bIns="0" rtlCol="0">
+                <a:spAutoFit/>
+              </a:bodyPr>
+              <a:lstStyle/>
+              <a:p>
+                <a14:m>
+                  <m:oMathPara xmlns:m="http://schemas.openxmlformats.org/officeDocument/2006/math">
+                    <m:oMathParaPr>
+                      <m:jc m:val="centerGroup"/>
+                    </m:oMathParaPr>
+                    <m:oMath xmlns:m="http://schemas.openxmlformats.org/officeDocument/2006/math">
+                      <m:r>
+                        <a:rPr lang="sv-SE" b="0" i="1" smtClean="0">
+                          <a:latin typeface="Cambria Math" panose="02040503050406030204" pitchFamily="18" charset="0"/>
+                        </a:rPr>
+                        <m:t>𝑖</m:t>
+                      </m:r>
+                      <m:r>
+                        <a:rPr lang="sv-SE" b="0" i="1" smtClean="0">
+                          <a:latin typeface="Cambria Math" panose="02040503050406030204" pitchFamily="18" charset="0"/>
+                        </a:rPr>
+                        <m:t>=</m:t>
+                      </m:r>
+                      <m:r>
+                        <m:rPr>
+                          <m:nor/>
+                        </m:rPr>
+                        <a:rPr lang="sv-SE" b="0" i="0" smtClean="0">
+                          <a:latin typeface="Cambria Math" panose="02040503050406030204" pitchFamily="18" charset="0"/>
+                        </a:rPr>
+                        <m:t>contig</m:t>
+                      </m:r>
+                      <m:r>
+                        <a:rPr lang="sv-SE" b="0" i="0" smtClean="0">
+                          <a:latin typeface="Cambria Math" panose="02040503050406030204" pitchFamily="18" charset="0"/>
+                        </a:rPr>
+                        <m:t>;</m:t>
+                      </m:r>
+                      <m:r>
+                        <m:rPr>
+                          <m:sty m:val="p"/>
+                        </m:rPr>
+                        <a:rPr lang="sv-SE" b="0" i="0" smtClean="0">
+                          <a:latin typeface="Cambria Math" panose="02040503050406030204" pitchFamily="18" charset="0"/>
+                        </a:rPr>
+                        <m:t>L</m:t>
+                      </m:r>
+                      <m:r>
+                        <a:rPr lang="sv-SE" b="0" i="0" smtClean="0">
+                          <a:latin typeface="Cambria Math" panose="02040503050406030204" pitchFamily="18" charset="0"/>
+                        </a:rPr>
+                        <m:t>=</m:t>
+                      </m:r>
+                      <m:r>
+                        <m:rPr>
+                          <m:sty m:val="p"/>
+                        </m:rPr>
+                        <a:rPr lang="sv-SE" b="0" i="0" smtClean="0">
+                          <a:latin typeface="Cambria Math" panose="02040503050406030204" pitchFamily="18" charset="0"/>
+                        </a:rPr>
+                        <m:t>length</m:t>
+                      </m:r>
+                      <m:r>
+                        <a:rPr lang="sv-SE" b="0" i="0" smtClean="0">
+                          <a:latin typeface="Cambria Math" panose="02040503050406030204" pitchFamily="18" charset="0"/>
+                        </a:rPr>
+                        <m:t>;</m:t>
+                      </m:r>
+                      <m:r>
+                        <m:rPr>
+                          <m:sty m:val="p"/>
+                        </m:rPr>
+                        <a:rPr lang="sv-SE" b="0" i="0" smtClean="0">
+                          <a:latin typeface="Cambria Math" panose="02040503050406030204" pitchFamily="18" charset="0"/>
+                        </a:rPr>
+                        <m:t>n</m:t>
+                      </m:r>
+                      <m:r>
+                        <a:rPr lang="sv-SE" b="0" i="0" smtClean="0">
+                          <a:latin typeface="Cambria Math" panose="02040503050406030204" pitchFamily="18" charset="0"/>
+                        </a:rPr>
+                        <m:t>=</m:t>
+                      </m:r>
+                      <m:r>
+                        <m:rPr>
+                          <m:sty m:val="p"/>
+                        </m:rPr>
+                        <a:rPr lang="sv-SE" b="0" i="0" smtClean="0">
+                          <a:latin typeface="Cambria Math" panose="02040503050406030204" pitchFamily="18" charset="0"/>
+                        </a:rPr>
+                        <m:t>relative</m:t>
+                      </m:r>
+                      <m:r>
+                        <a:rPr lang="sv-SE" b="0" i="0" smtClean="0">
+                          <a:latin typeface="Cambria Math" panose="02040503050406030204" pitchFamily="18" charset="0"/>
+                        </a:rPr>
+                        <m:t> </m:t>
+                      </m:r>
+                      <m:r>
+                        <m:rPr>
+                          <m:sty m:val="p"/>
+                        </m:rPr>
+                        <a:rPr lang="sv-SE" b="0" i="0" smtClean="0">
+                          <a:latin typeface="Cambria Math" panose="02040503050406030204" pitchFamily="18" charset="0"/>
+                        </a:rPr>
+                        <m:t>number</m:t>
+                      </m:r>
+                      <m:r>
+                        <a:rPr lang="sv-SE" b="0" i="0" smtClean="0">
+                          <a:latin typeface="Cambria Math" panose="02040503050406030204" pitchFamily="18" charset="0"/>
+                        </a:rPr>
+                        <m:t>;</m:t>
+                      </m:r>
+                      <m:r>
+                        <m:rPr>
+                          <m:sty m:val="p"/>
+                        </m:rPr>
+                        <a:rPr lang="sv-SE" b="0" i="0" smtClean="0">
+                          <a:latin typeface="Cambria Math" panose="02040503050406030204" pitchFamily="18" charset="0"/>
+                        </a:rPr>
+                        <m:t>N</m:t>
+                      </m:r>
+                      <m:r>
+                        <a:rPr lang="sv-SE" b="0" i="0" smtClean="0">
+                          <a:latin typeface="Cambria Math" panose="02040503050406030204" pitchFamily="18" charset="0"/>
+                        </a:rPr>
+                        <m:t>=</m:t>
+                      </m:r>
+                      <m:r>
+                        <m:rPr>
+                          <m:sty m:val="p"/>
+                        </m:rPr>
+                        <a:rPr lang="sv-SE" b="0" i="0" smtClean="0">
+                          <a:latin typeface="Cambria Math" panose="02040503050406030204" pitchFamily="18" charset="0"/>
+                        </a:rPr>
+                        <m:t>total</m:t>
+                      </m:r>
+                      <m:r>
+                        <a:rPr lang="sv-SE" b="0" i="0" smtClean="0">
+                          <a:latin typeface="Cambria Math" panose="02040503050406030204" pitchFamily="18" charset="0"/>
+                        </a:rPr>
+                        <m:t> </m:t>
+                      </m:r>
+                      <m:r>
+                        <m:rPr>
+                          <m:sty m:val="p"/>
+                        </m:rPr>
+                        <a:rPr lang="sv-SE" b="0" i="0" smtClean="0">
+                          <a:latin typeface="Cambria Math" panose="02040503050406030204" pitchFamily="18" charset="0"/>
+                        </a:rPr>
+                        <m:t>number</m:t>
+                      </m:r>
+                    </m:oMath>
+                  </m:oMathPara>
+                </a14:m>
+                <a:endParaRPr lang="en-GB" dirty="0"/>
+              </a:p>
+            </p:txBody>
+          </p:sp>
+        </mc:Choice>
+        <mc:Fallback>
+          <p:sp>
+            <p:nvSpPr>
+              <p:cNvPr id="8" name="TextBox 7">
+                <a:extLst>
+                  <a:ext uri="{FF2B5EF4-FFF2-40B4-BE49-F238E27FC236}">
+                    <a16:creationId xmlns:a16="http://schemas.microsoft.com/office/drawing/2014/main" id="{DCFA5F45-635D-8040-B09D-4BB9E939B896}"/>
+                  </a:ext>
+                </a:extLst>
+              </p:cNvPr>
+              <p:cNvSpPr txBox="1">
+                <a:spLocks noRot="1" noChangeAspect="1" noMove="1" noResize="1" noEditPoints="1" noAdjustHandles="1" noChangeArrowheads="1" noChangeShapeType="1" noTextEdit="1"/>
+              </p:cNvSpPr>
+              <p:nvPr/>
+            </p:nvSpPr>
+            <p:spPr>
+              <a:xfrm>
+                <a:off x="3272378" y="964709"/>
+                <a:ext cx="6202082" cy="276999"/>
+              </a:xfrm>
+              <a:prstGeom prst="rect">
+                <a:avLst/>
+              </a:prstGeom>
+              <a:blipFill>
+                <a:blip r:embed="rId4"/>
+                <a:stretch>
+                  <a:fillRect t="-4348" b="-34783"/>
+                </a:stretch>
+              </a:blipFill>
+            </p:spPr>
+            <p:txBody>
+              <a:bodyPr/>
+              <a:lstStyle/>
+              <a:p>
+                <a:r>
+                  <a:rPr lang="en-GB">
+                    <a:noFill/>
+                  </a:rPr>
+                  <a:t> </a:t>
+                </a:r>
+              </a:p>
+            </p:txBody>
+          </p:sp>
+        </mc:Fallback>
+      </mc:AlternateContent>
     </p:spTree>
     <p:extLst>
       <p:ext uri="{BB962C8B-B14F-4D97-AF65-F5344CB8AC3E}">

</xml_diff>

<commit_message>
fix missing GT individuals
</commit_message>
<xml_diff>
--- a/short_genetic_variants/docs/short_indels.pptx
+++ b/short_genetic_variants/docs/short_indels.pptx
@@ -8,7 +8,14 @@
     <p:sldId id="256" r:id="rId2"/>
     <p:sldId id="257" r:id="rId3"/>
     <p:sldId id="259" r:id="rId4"/>
-    <p:sldId id="258" r:id="rId5"/>
+    <p:sldId id="264" r:id="rId5"/>
+    <p:sldId id="265" r:id="rId6"/>
+    <p:sldId id="260" r:id="rId7"/>
+    <p:sldId id="263" r:id="rId8"/>
+    <p:sldId id="258" r:id="rId9"/>
+    <p:sldId id="261" r:id="rId10"/>
+    <p:sldId id="262" r:id="rId11"/>
+    <p:sldId id="266" r:id="rId12"/>
   </p:sldIdLst>
   <p:sldSz cx="12192000" cy="6858000"/>
   <p:notesSz cx="6858000" cy="9144000"/>
@@ -264,7 +271,7 @@
           <a:p>
             <a:fld id="{5C316670-22DA-CE45-BF19-C0B19D676291}" type="datetimeFigureOut">
               <a:rPr lang="en-GB" smtClean="0"/>
-              <a:t>11/06/2020</a:t>
+              <a:t>16/06/2020</a:t>
             </a:fld>
             <a:endParaRPr lang="en-GB"/>
           </a:p>
@@ -464,7 +471,7 @@
           <a:p>
             <a:fld id="{5C316670-22DA-CE45-BF19-C0B19D676291}" type="datetimeFigureOut">
               <a:rPr lang="en-GB" smtClean="0"/>
-              <a:t>11/06/2020</a:t>
+              <a:t>16/06/2020</a:t>
             </a:fld>
             <a:endParaRPr lang="en-GB"/>
           </a:p>
@@ -674,7 +681,7 @@
           <a:p>
             <a:fld id="{5C316670-22DA-CE45-BF19-C0B19D676291}" type="datetimeFigureOut">
               <a:rPr lang="en-GB" smtClean="0"/>
-              <a:t>11/06/2020</a:t>
+              <a:t>16/06/2020</a:t>
             </a:fld>
             <a:endParaRPr lang="en-GB"/>
           </a:p>
@@ -874,7 +881,7 @@
           <a:p>
             <a:fld id="{5C316670-22DA-CE45-BF19-C0B19D676291}" type="datetimeFigureOut">
               <a:rPr lang="en-GB" smtClean="0"/>
-              <a:t>11/06/2020</a:t>
+              <a:t>16/06/2020</a:t>
             </a:fld>
             <a:endParaRPr lang="en-GB"/>
           </a:p>
@@ -1150,7 +1157,7 @@
           <a:p>
             <a:fld id="{5C316670-22DA-CE45-BF19-C0B19D676291}" type="datetimeFigureOut">
               <a:rPr lang="en-GB" smtClean="0"/>
-              <a:t>11/06/2020</a:t>
+              <a:t>16/06/2020</a:t>
             </a:fld>
             <a:endParaRPr lang="en-GB"/>
           </a:p>
@@ -1418,7 +1425,7 @@
           <a:p>
             <a:fld id="{5C316670-22DA-CE45-BF19-C0B19D676291}" type="datetimeFigureOut">
               <a:rPr lang="en-GB" smtClean="0"/>
-              <a:t>11/06/2020</a:t>
+              <a:t>16/06/2020</a:t>
             </a:fld>
             <a:endParaRPr lang="en-GB"/>
           </a:p>
@@ -1833,7 +1840,7 @@
           <a:p>
             <a:fld id="{5C316670-22DA-CE45-BF19-C0B19D676291}" type="datetimeFigureOut">
               <a:rPr lang="en-GB" smtClean="0"/>
-              <a:t>11/06/2020</a:t>
+              <a:t>16/06/2020</a:t>
             </a:fld>
             <a:endParaRPr lang="en-GB"/>
           </a:p>
@@ -1975,7 +1982,7 @@
           <a:p>
             <a:fld id="{5C316670-22DA-CE45-BF19-C0B19D676291}" type="datetimeFigureOut">
               <a:rPr lang="en-GB" smtClean="0"/>
-              <a:t>11/06/2020</a:t>
+              <a:t>16/06/2020</a:t>
             </a:fld>
             <a:endParaRPr lang="en-GB"/>
           </a:p>
@@ -2088,7 +2095,7 @@
           <a:p>
             <a:fld id="{5C316670-22DA-CE45-BF19-C0B19D676291}" type="datetimeFigureOut">
               <a:rPr lang="en-GB" smtClean="0"/>
-              <a:t>11/06/2020</a:t>
+              <a:t>16/06/2020</a:t>
             </a:fld>
             <a:endParaRPr lang="en-GB"/>
           </a:p>
@@ -2401,7 +2408,7 @@
           <a:p>
             <a:fld id="{5C316670-22DA-CE45-BF19-C0B19D676291}" type="datetimeFigureOut">
               <a:rPr lang="en-GB" smtClean="0"/>
-              <a:t>11/06/2020</a:t>
+              <a:t>16/06/2020</a:t>
             </a:fld>
             <a:endParaRPr lang="en-GB"/>
           </a:p>
@@ -2690,7 +2697,7 @@
           <a:p>
             <a:fld id="{5C316670-22DA-CE45-BF19-C0B19D676291}" type="datetimeFigureOut">
               <a:rPr lang="en-GB" smtClean="0"/>
-              <a:t>11/06/2020</a:t>
+              <a:t>16/06/2020</a:t>
             </a:fld>
             <a:endParaRPr lang="en-GB"/>
           </a:p>
@@ -2933,7 +2940,7 @@
           <a:p>
             <a:fld id="{5C316670-22DA-CE45-BF19-C0B19D676291}" type="datetimeFigureOut">
               <a:rPr lang="en-GB" smtClean="0"/>
-              <a:t>11/06/2020</a:t>
+              <a:t>16/06/2020</a:t>
             </a:fld>
             <a:endParaRPr lang="en-GB"/>
           </a:p>
@@ -3393,6 +3400,395 @@
 </p:sld>
 </file>
 
+<file path=ppt/slides/slide10.xml><?xml version="1.0" encoding="utf-8"?>
+<p:sld xmlns:a="http://schemas.openxmlformats.org/drawingml/2006/main" xmlns:r="http://schemas.openxmlformats.org/officeDocument/2006/relationships" xmlns:p="http://schemas.openxmlformats.org/presentationml/2006/main">
+  <p:cSld>
+    <p:spTree>
+      <p:nvGrpSpPr>
+        <p:cNvPr id="1" name=""/>
+        <p:cNvGrpSpPr/>
+        <p:nvPr/>
+      </p:nvGrpSpPr>
+      <p:grpSpPr>
+        <a:xfrm>
+          <a:off x="0" y="0"/>
+          <a:ext cx="0" cy="0"/>
+          <a:chOff x="0" y="0"/>
+          <a:chExt cx="0" cy="0"/>
+        </a:xfrm>
+      </p:grpSpPr>
+      <p:sp>
+        <p:nvSpPr>
+          <p:cNvPr id="2" name="Rectangle 1">
+            <a:extLst>
+              <a:ext uri="{FF2B5EF4-FFF2-40B4-BE49-F238E27FC236}">
+                <a16:creationId xmlns:a16="http://schemas.microsoft.com/office/drawing/2014/main" id="{28EB9195-3465-C644-B592-B32C34D4FFCF}"/>
+              </a:ext>
+            </a:extLst>
+          </p:cNvPr>
+          <p:cNvSpPr/>
+          <p:nvPr/>
+        </p:nvSpPr>
+        <p:spPr>
+          <a:xfrm>
+            <a:off x="528115" y="409596"/>
+            <a:ext cx="4088812" cy="369332"/>
+          </a:xfrm>
+          <a:prstGeom prst="rect">
+            <a:avLst/>
+          </a:prstGeom>
+        </p:spPr>
+        <p:txBody>
+          <a:bodyPr wrap="none">
+            <a:spAutoFit/>
+          </a:bodyPr>
+          <a:lstStyle/>
+          <a:p>
+            <a:pPr marL="342900" indent="-342900">
+              <a:buFont typeface="+mj-lt"/>
+              <a:buAutoNum type="arabicPeriod" startAt="2"/>
+            </a:pPr>
+            <a:r>
+              <a:rPr lang="en-GB" dirty="0"/>
+              <a:t>Clustering of (different types) markers</a:t>
+            </a:r>
+          </a:p>
+        </p:txBody>
+      </p:sp>
+      <p:sp>
+        <p:nvSpPr>
+          <p:cNvPr id="12" name="TextBox 11">
+            <a:extLst>
+              <a:ext uri="{FF2B5EF4-FFF2-40B4-BE49-F238E27FC236}">
+                <a16:creationId xmlns:a16="http://schemas.microsoft.com/office/drawing/2014/main" id="{EE2B360A-DD67-7142-A309-F624C4AD0FFE}"/>
+              </a:ext>
+            </a:extLst>
+          </p:cNvPr>
+          <p:cNvSpPr txBox="1"/>
+          <p:nvPr/>
+        </p:nvSpPr>
+        <p:spPr>
+          <a:xfrm>
+            <a:off x="528115" y="891445"/>
+            <a:ext cx="4200574" cy="369332"/>
+          </a:xfrm>
+          <a:prstGeom prst="rect">
+            <a:avLst/>
+          </a:prstGeom>
+          <a:noFill/>
+        </p:spPr>
+        <p:txBody>
+          <a:bodyPr wrap="none" rtlCol="0">
+            <a:spAutoFit/>
+          </a:bodyPr>
+          <a:lstStyle/>
+          <a:p>
+            <a:pPr marL="285750" indent="-285750">
+              <a:buFont typeface="Arial" panose="020B0604020202020204" pitchFamily="34" charset="0"/>
+              <a:buChar char="•"/>
+            </a:pPr>
+            <a:r>
+              <a:rPr lang="en-GB" dirty="0"/>
+              <a:t>All INDELs and SNPs in the same contigs</a:t>
+            </a:r>
+          </a:p>
+        </p:txBody>
+      </p:sp>
+      <p:pic>
+        <p:nvPicPr>
+          <p:cNvPr id="5" name="Picture 4">
+            <a:extLst>
+              <a:ext uri="{FF2B5EF4-FFF2-40B4-BE49-F238E27FC236}">
+                <a16:creationId xmlns:a16="http://schemas.microsoft.com/office/drawing/2014/main" id="{45111D7B-4ED4-EF4A-AB65-A68ADF1553DB}"/>
+              </a:ext>
+            </a:extLst>
+          </p:cNvPr>
+          <p:cNvPicPr>
+            <a:picLocks noChangeAspect="1"/>
+          </p:cNvPicPr>
+          <p:nvPr/>
+        </p:nvPicPr>
+        <p:blipFill>
+          <a:blip r:embed="rId2"/>
+          <a:stretch>
+            <a:fillRect/>
+          </a:stretch>
+        </p:blipFill>
+        <p:spPr>
+          <a:xfrm>
+            <a:off x="6231303" y="2139711"/>
+            <a:ext cx="5960697" cy="3960000"/>
+          </a:xfrm>
+          <a:prstGeom prst="rect">
+            <a:avLst/>
+          </a:prstGeom>
+        </p:spPr>
+      </p:pic>
+      <p:pic>
+        <p:nvPicPr>
+          <p:cNvPr id="11" name="Picture 10">
+            <a:extLst>
+              <a:ext uri="{FF2B5EF4-FFF2-40B4-BE49-F238E27FC236}">
+                <a16:creationId xmlns:a16="http://schemas.microsoft.com/office/drawing/2014/main" id="{4FC862F5-8C05-C843-B607-99A4AC1DBDDB}"/>
+              </a:ext>
+            </a:extLst>
+          </p:cNvPr>
+          <p:cNvPicPr>
+            <a:picLocks noChangeAspect="1"/>
+          </p:cNvPicPr>
+          <p:nvPr/>
+        </p:nvPicPr>
+        <p:blipFill>
+          <a:blip r:embed="rId3"/>
+          <a:stretch>
+            <a:fillRect/>
+          </a:stretch>
+        </p:blipFill>
+        <p:spPr>
+          <a:xfrm>
+            <a:off x="147500" y="2139711"/>
+            <a:ext cx="5960697" cy="3960000"/>
+          </a:xfrm>
+          <a:prstGeom prst="rect">
+            <a:avLst/>
+          </a:prstGeom>
+        </p:spPr>
+      </p:pic>
+      <p:sp>
+        <p:nvSpPr>
+          <p:cNvPr id="13" name="TextBox 12">
+            <a:extLst>
+              <a:ext uri="{FF2B5EF4-FFF2-40B4-BE49-F238E27FC236}">
+                <a16:creationId xmlns:a16="http://schemas.microsoft.com/office/drawing/2014/main" id="{98F2178F-C54F-B04E-8B00-BD411D876DA6}"/>
+              </a:ext>
+            </a:extLst>
+          </p:cNvPr>
+          <p:cNvSpPr txBox="1"/>
+          <p:nvPr/>
+        </p:nvSpPr>
+        <p:spPr>
+          <a:xfrm>
+            <a:off x="89627" y="6090207"/>
+            <a:ext cx="11704976" cy="646331"/>
+          </a:xfrm>
+          <a:prstGeom prst="rect">
+            <a:avLst/>
+          </a:prstGeom>
+          <a:noFill/>
+        </p:spPr>
+        <p:txBody>
+          <a:bodyPr wrap="square" rtlCol="0">
+            <a:spAutoFit/>
+          </a:bodyPr>
+          <a:lstStyle/>
+          <a:p>
+            <a:r>
+              <a:rPr lang="en-GB" i="1" dirty="0"/>
+              <a:t>Figure 2. Relationship between SNPs and INDELs with respect to their proportions (left) and their counts (right) per contig. Proportions and counts of SNPs and INDELs are the same as in Fig. 1-2.</a:t>
+            </a:r>
+          </a:p>
+        </p:txBody>
+      </p:sp>
+    </p:spTree>
+    <p:extLst>
+      <p:ext uri="{BB962C8B-B14F-4D97-AF65-F5344CB8AC3E}">
+        <p14:creationId xmlns:p14="http://schemas.microsoft.com/office/powerpoint/2010/main" val="3939953827"/>
+      </p:ext>
+    </p:extLst>
+  </p:cSld>
+  <p:clrMapOvr>
+    <a:masterClrMapping/>
+  </p:clrMapOvr>
+</p:sld>
+</file>
+
+<file path=ppt/slides/slide11.xml><?xml version="1.0" encoding="utf-8"?>
+<p:sld xmlns:a="http://schemas.openxmlformats.org/drawingml/2006/main" xmlns:r="http://schemas.openxmlformats.org/officeDocument/2006/relationships" xmlns:p="http://schemas.openxmlformats.org/presentationml/2006/main">
+  <p:cSld>
+    <p:spTree>
+      <p:nvGrpSpPr>
+        <p:cNvPr id="1" name=""/>
+        <p:cNvGrpSpPr/>
+        <p:nvPr/>
+      </p:nvGrpSpPr>
+      <p:grpSpPr>
+        <a:xfrm>
+          <a:off x="0" y="0"/>
+          <a:ext cx="0" cy="0"/>
+          <a:chOff x="0" y="0"/>
+          <a:chExt cx="0" cy="0"/>
+        </a:xfrm>
+      </p:grpSpPr>
+      <p:sp>
+        <p:nvSpPr>
+          <p:cNvPr id="2" name="Rectangle 1">
+            <a:extLst>
+              <a:ext uri="{FF2B5EF4-FFF2-40B4-BE49-F238E27FC236}">
+                <a16:creationId xmlns:a16="http://schemas.microsoft.com/office/drawing/2014/main" id="{28EB9195-3465-C644-B592-B32C34D4FFCF}"/>
+              </a:ext>
+            </a:extLst>
+          </p:cNvPr>
+          <p:cNvSpPr/>
+          <p:nvPr/>
+        </p:nvSpPr>
+        <p:spPr>
+          <a:xfrm>
+            <a:off x="528115" y="409596"/>
+            <a:ext cx="2967031" cy="369332"/>
+          </a:xfrm>
+          <a:prstGeom prst="rect">
+            <a:avLst/>
+          </a:prstGeom>
+        </p:spPr>
+        <p:txBody>
+          <a:bodyPr wrap="none">
+            <a:spAutoFit/>
+          </a:bodyPr>
+          <a:lstStyle/>
+          <a:p>
+            <a:pPr marL="342900" indent="-342900">
+              <a:buFont typeface="+mj-lt"/>
+              <a:buAutoNum type="arabicPeriod" startAt="3"/>
+            </a:pPr>
+            <a:r>
+              <a:rPr lang="en-GB" dirty="0"/>
+              <a:t>Derived allele frequencies</a:t>
+            </a:r>
+          </a:p>
+        </p:txBody>
+      </p:sp>
+      <p:sp>
+        <p:nvSpPr>
+          <p:cNvPr id="12" name="TextBox 11">
+            <a:extLst>
+              <a:ext uri="{FF2B5EF4-FFF2-40B4-BE49-F238E27FC236}">
+                <a16:creationId xmlns:a16="http://schemas.microsoft.com/office/drawing/2014/main" id="{EE2B360A-DD67-7142-A309-F624C4AD0FFE}"/>
+              </a:ext>
+            </a:extLst>
+          </p:cNvPr>
+          <p:cNvSpPr txBox="1"/>
+          <p:nvPr/>
+        </p:nvSpPr>
+        <p:spPr>
+          <a:xfrm>
+            <a:off x="528115" y="891445"/>
+            <a:ext cx="5664341" cy="2862322"/>
+          </a:xfrm>
+          <a:prstGeom prst="rect">
+            <a:avLst/>
+          </a:prstGeom>
+          <a:noFill/>
+        </p:spPr>
+        <p:txBody>
+          <a:bodyPr wrap="square" rtlCol="0">
+            <a:spAutoFit/>
+          </a:bodyPr>
+          <a:lstStyle/>
+          <a:p>
+            <a:pPr marL="285750" indent="-285750">
+              <a:buFont typeface="Arial" panose="020B0604020202020204" pitchFamily="34" charset="0"/>
+              <a:buChar char="•"/>
+            </a:pPr>
+            <a:r>
+              <a:rPr lang="en-GB" dirty="0"/>
+              <a:t>Ancestral allele was inferred from called genotypes:</a:t>
+            </a:r>
+            <a:br>
+              <a:rPr lang="en-GB" dirty="0"/>
+            </a:br>
+            <a:endParaRPr lang="en-GB" dirty="0"/>
+          </a:p>
+          <a:p>
+            <a:pPr marL="800100" lvl="1" indent="-342900">
+              <a:buFont typeface="+mj-lt"/>
+              <a:buAutoNum type="arabicPeriod"/>
+            </a:pPr>
+            <a:r>
+              <a:rPr lang="en-GB" dirty="0"/>
+              <a:t>Reference allele = ancestral allele</a:t>
+            </a:r>
+            <a:br>
+              <a:rPr lang="en-GB" dirty="0"/>
+            </a:br>
+            <a:r>
+              <a:rPr lang="en-GB" i="1" dirty="0" err="1"/>
+              <a:t>compressa</a:t>
+            </a:r>
+            <a:r>
+              <a:rPr lang="en-GB" dirty="0"/>
+              <a:t> is homo for the reference allele (0)</a:t>
+            </a:r>
+            <a:br>
+              <a:rPr lang="en-GB" dirty="0"/>
+            </a:br>
+            <a:endParaRPr lang="en-GB" dirty="0"/>
+          </a:p>
+          <a:p>
+            <a:pPr marL="800100" lvl="1" indent="-342900">
+              <a:buFont typeface="+mj-lt"/>
+              <a:buAutoNum type="arabicPeriod"/>
+            </a:pPr>
+            <a:r>
+              <a:rPr lang="en-GB" dirty="0"/>
+              <a:t>Alternative allele = ancestral allele</a:t>
+            </a:r>
+            <a:br>
+              <a:rPr lang="en-GB" dirty="0"/>
+            </a:br>
+            <a:r>
+              <a:rPr lang="en-GB" i="1" dirty="0" err="1"/>
+              <a:t>compressa</a:t>
+            </a:r>
+            <a:r>
+              <a:rPr lang="en-GB" dirty="0"/>
+              <a:t> is homo for the alternative allele (2)</a:t>
+            </a:r>
+            <a:br>
+              <a:rPr lang="en-GB" dirty="0"/>
+            </a:br>
+            <a:endParaRPr lang="en-GB" dirty="0"/>
+          </a:p>
+          <a:p>
+            <a:pPr marL="800100" lvl="1" indent="-342900">
+              <a:buFont typeface="+mj-lt"/>
+              <a:buAutoNum type="arabicPeriod"/>
+            </a:pPr>
+            <a:r>
+              <a:rPr lang="en-GB" dirty="0"/>
+              <a:t>Unknown ancestry</a:t>
+            </a:r>
+            <a:br>
+              <a:rPr lang="en-GB" dirty="0"/>
+            </a:br>
+            <a:r>
+              <a:rPr lang="en-GB" i="1" dirty="0" err="1"/>
+              <a:t>compressa</a:t>
+            </a:r>
+            <a:r>
+              <a:rPr lang="en-GB" i="1" dirty="0"/>
+              <a:t> </a:t>
+            </a:r>
+            <a:r>
+              <a:rPr lang="en-GB"/>
+              <a:t>is het (1)</a:t>
+            </a:r>
+            <a:endParaRPr lang="en-GB" dirty="0"/>
+          </a:p>
+        </p:txBody>
+      </p:sp>
+    </p:spTree>
+    <p:extLst>
+      <p:ext uri="{BB962C8B-B14F-4D97-AF65-F5344CB8AC3E}">
+        <p14:creationId xmlns:p14="http://schemas.microsoft.com/office/powerpoint/2010/main" val="1238933828"/>
+      </p:ext>
+    </p:extLst>
+  </p:cSld>
+  <p:clrMapOvr>
+    <a:masterClrMapping/>
+  </p:clrMapOvr>
+</p:sld>
+</file>
+
 <file path=ppt/slides/slide2.xml><?xml version="1.0" encoding="utf-8"?>
 <p:sld xmlns:a="http://schemas.openxmlformats.org/drawingml/2006/main" xmlns:r="http://schemas.openxmlformats.org/officeDocument/2006/relationships" xmlns:p="http://schemas.openxmlformats.org/presentationml/2006/main">
   <p:cSld>
@@ -3484,7 +3880,7 @@
         <p:spPr>
           <a:xfrm>
             <a:off x="1250066" y="3113590"/>
-            <a:ext cx="4088812" cy="923330"/>
+            <a:ext cx="4088812" cy="1200329"/>
           </a:xfrm>
           <a:prstGeom prst="rect">
             <a:avLst/>
@@ -3523,7 +3919,87 @@
             </a:pPr>
             <a:r>
               <a:rPr lang="en-GB" dirty="0"/>
+              <a:t>Allele frequencies</a:t>
+            </a:r>
+          </a:p>
+          <a:p>
+            <a:pPr marL="342900" indent="-342900">
+              <a:buFont typeface="+mj-lt"/>
+              <a:buAutoNum type="arabicPeriod"/>
+            </a:pPr>
+            <a:r>
+              <a:rPr lang="en-GB" dirty="0"/>
               <a:t>Displacement of cline centres</a:t>
+            </a:r>
+          </a:p>
+        </p:txBody>
+      </p:sp>
+      <p:sp>
+        <p:nvSpPr>
+          <p:cNvPr id="4" name="TextBox 3">
+            <a:extLst>
+              <a:ext uri="{FF2B5EF4-FFF2-40B4-BE49-F238E27FC236}">
+                <a16:creationId xmlns:a16="http://schemas.microsoft.com/office/drawing/2014/main" id="{E0575A65-E5F2-544E-A20B-4AC528CC804B}"/>
+              </a:ext>
+            </a:extLst>
+          </p:cNvPr>
+          <p:cNvSpPr txBox="1"/>
+          <p:nvPr/>
+        </p:nvSpPr>
+        <p:spPr>
+          <a:xfrm>
+            <a:off x="1076446" y="498769"/>
+            <a:ext cx="4247766" cy="369332"/>
+          </a:xfrm>
+          <a:prstGeom prst="rect">
+            <a:avLst/>
+          </a:prstGeom>
+          <a:noFill/>
+        </p:spPr>
+        <p:txBody>
+          <a:bodyPr wrap="none" rtlCol="0">
+            <a:spAutoFit/>
+          </a:bodyPr>
+          <a:lstStyle/>
+          <a:p>
+            <a:r>
+              <a:rPr lang="en-GB" dirty="0"/>
+              <a:t>Original aspects of the short INDELs project</a:t>
+            </a:r>
+          </a:p>
+        </p:txBody>
+      </p:sp>
+      <p:sp>
+        <p:nvSpPr>
+          <p:cNvPr id="5" name="TextBox 4">
+            <a:extLst>
+              <a:ext uri="{FF2B5EF4-FFF2-40B4-BE49-F238E27FC236}">
+                <a16:creationId xmlns:a16="http://schemas.microsoft.com/office/drawing/2014/main" id="{7582EF19-BA6B-6245-89EB-9D22A3FCE7F3}"/>
+              </a:ext>
+            </a:extLst>
+          </p:cNvPr>
+          <p:cNvSpPr txBox="1"/>
+          <p:nvPr/>
+        </p:nvSpPr>
+        <p:spPr>
+          <a:xfrm>
+            <a:off x="1091112" y="2744258"/>
+            <a:ext cx="2431756" cy="369332"/>
+          </a:xfrm>
+          <a:prstGeom prst="rect">
+            <a:avLst/>
+          </a:prstGeom>
+          <a:noFill/>
+        </p:spPr>
+        <p:txBody>
+          <a:bodyPr wrap="none" rtlCol="0">
+            <a:spAutoFit/>
+          </a:bodyPr>
+          <a:lstStyle/>
+          <a:p>
+            <a:r>
+              <a:rPr lang="en-GB" dirty="0"/>
+              <a:t>INDEL-SNP comparisons</a:t>
             </a:r>
           </a:p>
         </p:txBody>
@@ -3572,7 +4048,7 @@
         </p:nvSpPr>
         <p:spPr>
           <a:xfrm>
-            <a:off x="528115" y="420111"/>
+            <a:off x="524719" y="189654"/>
             <a:ext cx="1922321" cy="369332"/>
           </a:xfrm>
           <a:prstGeom prst="rect">
@@ -3610,7 +4086,7 @@
         </p:nvSpPr>
         <p:spPr>
           <a:xfrm>
-            <a:off x="4486656" y="1041023"/>
+            <a:off x="4486656" y="543310"/>
             <a:ext cx="3129485" cy="5816977"/>
           </a:xfrm>
           <a:prstGeom prst="rect">
@@ -3625,7 +4101,15 @@
           <a:p>
             <a:r>
               <a:rPr lang="en-GB" sz="1200" dirty="0"/>
-              <a:t>Total number of SNP: 11225</a:t>
+              <a:t>Total number of SNP: </a:t>
+            </a:r>
+            <a:r>
+              <a:rPr lang="en-GB" sz="1200" dirty="0">
+                <a:solidFill>
+                  <a:srgbClr val="FF0000"/>
+                </a:solidFill>
+              </a:rPr>
+              <a:t>11225</a:t>
             </a:r>
           </a:p>
           <a:p>
@@ -3812,7 +4296,7 @@
         </p:nvSpPr>
         <p:spPr>
           <a:xfrm>
-            <a:off x="524719" y="1041022"/>
+            <a:off x="524719" y="543309"/>
             <a:ext cx="3961937" cy="5816977"/>
           </a:xfrm>
           <a:prstGeom prst="rect">
@@ -3827,7 +4311,15 @@
           <a:p>
             <a:r>
               <a:rPr lang="en-GB" sz="1200" dirty="0"/>
-              <a:t>Total number of Anja’s SNP: 55106</a:t>
+              <a:t>Total number of Anja’s SNP: </a:t>
+            </a:r>
+            <a:r>
+              <a:rPr lang="en-GB" sz="1200" dirty="0">
+                <a:solidFill>
+                  <a:srgbClr val="FF0000"/>
+                </a:solidFill>
+              </a:rPr>
+              <a:t>55106</a:t>
             </a:r>
           </a:p>
           <a:p>
@@ -4014,7 +4506,7 @@
         </p:nvSpPr>
         <p:spPr>
           <a:xfrm>
-            <a:off x="8001964" y="1041023"/>
+            <a:off x="8001964" y="543310"/>
             <a:ext cx="3306501" cy="5816977"/>
           </a:xfrm>
           <a:prstGeom prst="rect">
@@ -4198,6 +4690,41 @@
             <a:r>
               <a:rPr lang="en-GB" sz="1200" dirty="0"/>
               <a:t>1</a:t>
+            </a:r>
+          </a:p>
+        </p:txBody>
+      </p:sp>
+      <p:sp>
+        <p:nvSpPr>
+          <p:cNvPr id="6" name="TextBox 5">
+            <a:extLst>
+              <a:ext uri="{FF2B5EF4-FFF2-40B4-BE49-F238E27FC236}">
+                <a16:creationId xmlns:a16="http://schemas.microsoft.com/office/drawing/2014/main" id="{DC1E2925-1E88-B747-859F-421E2BE6AEAF}"/>
+              </a:ext>
+            </a:extLst>
+          </p:cNvPr>
+          <p:cNvSpPr txBox="1"/>
+          <p:nvPr/>
+        </p:nvSpPr>
+        <p:spPr>
+          <a:xfrm>
+            <a:off x="524719" y="6519446"/>
+            <a:ext cx="10911068" cy="338554"/>
+          </a:xfrm>
+          <a:prstGeom prst="rect">
+            <a:avLst/>
+          </a:prstGeom>
+          <a:noFill/>
+        </p:spPr>
+        <p:txBody>
+          <a:bodyPr wrap="square" rtlCol="0">
+            <a:spAutoFit/>
+          </a:bodyPr>
+          <a:lstStyle/>
+          <a:p>
+            <a:r>
+              <a:rPr lang="en-GB" sz="1600" dirty="0"/>
+              <a:t>Except this difference in the total number of SNPs, the proportions look quite similar but I have not run any statistical tests</a:t>
             </a:r>
           </a:p>
         </p:txBody>
@@ -4234,6 +4761,575 @@
       </p:grpSpPr>
       <p:sp>
         <p:nvSpPr>
+          <p:cNvPr id="2" name="TextBox 1">
+            <a:extLst>
+              <a:ext uri="{FF2B5EF4-FFF2-40B4-BE49-F238E27FC236}">
+                <a16:creationId xmlns:a16="http://schemas.microsoft.com/office/drawing/2014/main" id="{FB5A0D44-16E3-1349-AF6F-4FE1B4E42AE2}"/>
+              </a:ext>
+            </a:extLst>
+          </p:cNvPr>
+          <p:cNvSpPr txBox="1"/>
+          <p:nvPr/>
+        </p:nvSpPr>
+        <p:spPr>
+          <a:xfrm>
+            <a:off x="838631" y="277792"/>
+            <a:ext cx="10514738" cy="369332"/>
+          </a:xfrm>
+          <a:prstGeom prst="rect">
+            <a:avLst/>
+          </a:prstGeom>
+          <a:noFill/>
+        </p:spPr>
+        <p:txBody>
+          <a:bodyPr wrap="none" rtlCol="0">
+            <a:spAutoFit/>
+          </a:bodyPr>
+          <a:lstStyle/>
+          <a:p>
+            <a:r>
+              <a:rPr lang="en-GB" dirty="0"/>
+              <a:t>Given the difference between SAMtools and GATK in the total number of SNPs, I have run some diagnostics</a:t>
+            </a:r>
+          </a:p>
+        </p:txBody>
+      </p:sp>
+      <p:sp>
+        <p:nvSpPr>
+          <p:cNvPr id="13" name="TextBox 12">
+            <a:extLst>
+              <a:ext uri="{FF2B5EF4-FFF2-40B4-BE49-F238E27FC236}">
+                <a16:creationId xmlns:a16="http://schemas.microsoft.com/office/drawing/2014/main" id="{5CCE7386-BE2B-4440-AF7A-2468A67CEB1B}"/>
+              </a:ext>
+            </a:extLst>
+          </p:cNvPr>
+          <p:cNvSpPr txBox="1"/>
+          <p:nvPr/>
+        </p:nvSpPr>
+        <p:spPr>
+          <a:xfrm>
+            <a:off x="838629" y="1157735"/>
+            <a:ext cx="3064172" cy="369332"/>
+          </a:xfrm>
+          <a:prstGeom prst="rect">
+            <a:avLst/>
+          </a:prstGeom>
+          <a:noFill/>
+        </p:spPr>
+        <p:txBody>
+          <a:bodyPr wrap="none" rtlCol="0">
+            <a:spAutoFit/>
+          </a:bodyPr>
+          <a:lstStyle/>
+          <a:p>
+            <a:pPr marL="285750" indent="-285750">
+              <a:buFont typeface="Arial" panose="020B0604020202020204" pitchFamily="34" charset="0"/>
+              <a:buChar char="•"/>
+            </a:pPr>
+            <a:r>
+              <a:rPr lang="en-GB" dirty="0"/>
+              <a:t>Contigs after coverage filter</a:t>
+            </a:r>
+          </a:p>
+        </p:txBody>
+      </p:sp>
+    </p:spTree>
+    <p:extLst>
+      <p:ext uri="{BB962C8B-B14F-4D97-AF65-F5344CB8AC3E}">
+        <p14:creationId xmlns:p14="http://schemas.microsoft.com/office/powerpoint/2010/main" val="1844678427"/>
+      </p:ext>
+    </p:extLst>
+  </p:cSld>
+  <p:clrMapOvr>
+    <a:masterClrMapping/>
+  </p:clrMapOvr>
+</p:sld>
+</file>
+
+<file path=ppt/slides/slide5.xml><?xml version="1.0" encoding="utf-8"?>
+<p:sld xmlns:a="http://schemas.openxmlformats.org/drawingml/2006/main" xmlns:r="http://schemas.openxmlformats.org/officeDocument/2006/relationships" xmlns:p="http://schemas.openxmlformats.org/presentationml/2006/main">
+  <p:cSld>
+    <p:spTree>
+      <p:nvGrpSpPr>
+        <p:cNvPr id="1" name=""/>
+        <p:cNvGrpSpPr/>
+        <p:nvPr/>
+      </p:nvGrpSpPr>
+      <p:grpSpPr>
+        <a:xfrm>
+          <a:off x="0" y="0"/>
+          <a:ext cx="0" cy="0"/>
+          <a:chOff x="0" y="0"/>
+          <a:chExt cx="0" cy="0"/>
+        </a:xfrm>
+      </p:grpSpPr>
+      <p:sp>
+        <p:nvSpPr>
+          <p:cNvPr id="2" name="TextBox 1">
+            <a:extLst>
+              <a:ext uri="{FF2B5EF4-FFF2-40B4-BE49-F238E27FC236}">
+                <a16:creationId xmlns:a16="http://schemas.microsoft.com/office/drawing/2014/main" id="{FB5A0D44-16E3-1349-AF6F-4FE1B4E42AE2}"/>
+              </a:ext>
+            </a:extLst>
+          </p:cNvPr>
+          <p:cNvSpPr txBox="1"/>
+          <p:nvPr/>
+        </p:nvSpPr>
+        <p:spPr>
+          <a:xfrm>
+            <a:off x="838631" y="277792"/>
+            <a:ext cx="10514738" cy="369332"/>
+          </a:xfrm>
+          <a:prstGeom prst="rect">
+            <a:avLst/>
+          </a:prstGeom>
+          <a:noFill/>
+        </p:spPr>
+        <p:txBody>
+          <a:bodyPr wrap="none" rtlCol="0">
+            <a:spAutoFit/>
+          </a:bodyPr>
+          <a:lstStyle/>
+          <a:p>
+            <a:r>
+              <a:rPr lang="en-GB" dirty="0"/>
+              <a:t>Given the difference between SAMtools and GATK in the total number of SNPs, I have run some diagnostics</a:t>
+            </a:r>
+          </a:p>
+        </p:txBody>
+      </p:sp>
+      <p:sp>
+        <p:nvSpPr>
+          <p:cNvPr id="13" name="TextBox 12">
+            <a:extLst>
+              <a:ext uri="{FF2B5EF4-FFF2-40B4-BE49-F238E27FC236}">
+                <a16:creationId xmlns:a16="http://schemas.microsoft.com/office/drawing/2014/main" id="{5CCE7386-BE2B-4440-AF7A-2468A67CEB1B}"/>
+              </a:ext>
+            </a:extLst>
+          </p:cNvPr>
+          <p:cNvSpPr txBox="1"/>
+          <p:nvPr/>
+        </p:nvSpPr>
+        <p:spPr>
+          <a:xfrm>
+            <a:off x="838629" y="1157735"/>
+            <a:ext cx="2657009" cy="369332"/>
+          </a:xfrm>
+          <a:prstGeom prst="rect">
+            <a:avLst/>
+          </a:prstGeom>
+          <a:noFill/>
+        </p:spPr>
+        <p:txBody>
+          <a:bodyPr wrap="none" rtlCol="0">
+            <a:spAutoFit/>
+          </a:bodyPr>
+          <a:lstStyle/>
+          <a:p>
+            <a:pPr marL="285750" indent="-285750">
+              <a:buFont typeface="Arial" panose="020B0604020202020204" pitchFamily="34" charset="0"/>
+              <a:buChar char="•"/>
+            </a:pPr>
+            <a:r>
+              <a:rPr lang="en-GB" dirty="0"/>
+              <a:t>SNPs after all the filters</a:t>
+            </a:r>
+          </a:p>
+        </p:txBody>
+      </p:sp>
+    </p:spTree>
+    <p:extLst>
+      <p:ext uri="{BB962C8B-B14F-4D97-AF65-F5344CB8AC3E}">
+        <p14:creationId xmlns:p14="http://schemas.microsoft.com/office/powerpoint/2010/main" val="1445881728"/>
+      </p:ext>
+    </p:extLst>
+  </p:cSld>
+  <p:clrMapOvr>
+    <a:masterClrMapping/>
+  </p:clrMapOvr>
+</p:sld>
+</file>
+
+<file path=ppt/slides/slide6.xml><?xml version="1.0" encoding="utf-8"?>
+<p:sld xmlns:a="http://schemas.openxmlformats.org/drawingml/2006/main" xmlns:r="http://schemas.openxmlformats.org/officeDocument/2006/relationships" xmlns:p="http://schemas.openxmlformats.org/presentationml/2006/main">
+  <p:cSld>
+    <p:spTree>
+      <p:nvGrpSpPr>
+        <p:cNvPr id="1" name=""/>
+        <p:cNvGrpSpPr/>
+        <p:nvPr/>
+      </p:nvGrpSpPr>
+      <p:grpSpPr>
+        <a:xfrm>
+          <a:off x="0" y="0"/>
+          <a:ext cx="0" cy="0"/>
+          <a:chOff x="0" y="0"/>
+          <a:chExt cx="0" cy="0"/>
+        </a:xfrm>
+      </p:grpSpPr>
+      <p:sp>
+        <p:nvSpPr>
+          <p:cNvPr id="2" name="TextBox 1">
+            <a:extLst>
+              <a:ext uri="{FF2B5EF4-FFF2-40B4-BE49-F238E27FC236}">
+                <a16:creationId xmlns:a16="http://schemas.microsoft.com/office/drawing/2014/main" id="{FB5A0D44-16E3-1349-AF6F-4FE1B4E42AE2}"/>
+              </a:ext>
+            </a:extLst>
+          </p:cNvPr>
+          <p:cNvSpPr txBox="1"/>
+          <p:nvPr/>
+        </p:nvSpPr>
+        <p:spPr>
+          <a:xfrm>
+            <a:off x="838631" y="277792"/>
+            <a:ext cx="10514738" cy="369332"/>
+          </a:xfrm>
+          <a:prstGeom prst="rect">
+            <a:avLst/>
+          </a:prstGeom>
+          <a:noFill/>
+        </p:spPr>
+        <p:txBody>
+          <a:bodyPr wrap="none" rtlCol="0">
+            <a:spAutoFit/>
+          </a:bodyPr>
+          <a:lstStyle/>
+          <a:p>
+            <a:r>
+              <a:rPr lang="en-GB" dirty="0"/>
+              <a:t>Given the difference between SAMtools and GATK in the total number of SNPs, I have run some diagnostics</a:t>
+            </a:r>
+          </a:p>
+        </p:txBody>
+      </p:sp>
+      <p:pic>
+        <p:nvPicPr>
+          <p:cNvPr id="8" name="Picture 7">
+            <a:extLst>
+              <a:ext uri="{FF2B5EF4-FFF2-40B4-BE49-F238E27FC236}">
+                <a16:creationId xmlns:a16="http://schemas.microsoft.com/office/drawing/2014/main" id="{A4DAEDC7-A8EC-254B-A191-547A1418B8F6}"/>
+              </a:ext>
+            </a:extLst>
+          </p:cNvPr>
+          <p:cNvPicPr>
+            <a:picLocks noChangeAspect="1"/>
+          </p:cNvPicPr>
+          <p:nvPr/>
+        </p:nvPicPr>
+        <p:blipFill rotWithShape="1">
+          <a:blip r:embed="rId2"/>
+          <a:srcRect l="5258" t="9091" r="3176" b="5574"/>
+          <a:stretch/>
+        </p:blipFill>
+        <p:spPr>
+          <a:xfrm>
+            <a:off x="6231038" y="2037678"/>
+            <a:ext cx="5366790" cy="3326660"/>
+          </a:xfrm>
+          <a:prstGeom prst="rect">
+            <a:avLst/>
+          </a:prstGeom>
+        </p:spPr>
+      </p:pic>
+      <p:pic>
+        <p:nvPicPr>
+          <p:cNvPr id="10" name="Picture 9">
+            <a:extLst>
+              <a:ext uri="{FF2B5EF4-FFF2-40B4-BE49-F238E27FC236}">
+                <a16:creationId xmlns:a16="http://schemas.microsoft.com/office/drawing/2014/main" id="{AD14FF7D-63FD-9847-8532-4DE77B1CB03B}"/>
+              </a:ext>
+            </a:extLst>
+          </p:cNvPr>
+          <p:cNvPicPr>
+            <a:picLocks noChangeAspect="1"/>
+          </p:cNvPicPr>
+          <p:nvPr/>
+        </p:nvPicPr>
+        <p:blipFill rotWithShape="1">
+          <a:blip r:embed="rId3"/>
+          <a:srcRect l="4662" t="7646" r="3563" b="4847"/>
+          <a:stretch/>
+        </p:blipFill>
+        <p:spPr>
+          <a:xfrm>
+            <a:off x="838726" y="1985060"/>
+            <a:ext cx="5062966" cy="3379278"/>
+          </a:xfrm>
+          <a:prstGeom prst="rect">
+            <a:avLst/>
+          </a:prstGeom>
+        </p:spPr>
+      </p:pic>
+      <p:sp>
+        <p:nvSpPr>
+          <p:cNvPr id="11" name="TextBox 10">
+            <a:extLst>
+              <a:ext uri="{FF2B5EF4-FFF2-40B4-BE49-F238E27FC236}">
+                <a16:creationId xmlns:a16="http://schemas.microsoft.com/office/drawing/2014/main" id="{8E989DF7-7D26-A445-A99A-2791D7F96721}"/>
+              </a:ext>
+            </a:extLst>
+          </p:cNvPr>
+          <p:cNvSpPr txBox="1"/>
+          <p:nvPr/>
+        </p:nvSpPr>
+        <p:spPr>
+          <a:xfrm>
+            <a:off x="838629" y="1801172"/>
+            <a:ext cx="3031151" cy="307777"/>
+          </a:xfrm>
+          <a:prstGeom prst="rect">
+            <a:avLst/>
+          </a:prstGeom>
+          <a:noFill/>
+        </p:spPr>
+        <p:txBody>
+          <a:bodyPr wrap="none" rtlCol="0">
+            <a:spAutoFit/>
+          </a:bodyPr>
+          <a:lstStyle/>
+          <a:p>
+            <a:r>
+              <a:rPr lang="en-GB" sz="1400" dirty="0"/>
+              <a:t>any_outliers = outlier in at least one CZ</a:t>
+            </a:r>
+          </a:p>
+        </p:txBody>
+      </p:sp>
+      <p:sp>
+        <p:nvSpPr>
+          <p:cNvPr id="12" name="TextBox 11">
+            <a:extLst>
+              <a:ext uri="{FF2B5EF4-FFF2-40B4-BE49-F238E27FC236}">
+                <a16:creationId xmlns:a16="http://schemas.microsoft.com/office/drawing/2014/main" id="{7E719FF2-7BA6-5944-8D5D-B76085F0436D}"/>
+              </a:ext>
+            </a:extLst>
+          </p:cNvPr>
+          <p:cNvSpPr txBox="1"/>
+          <p:nvPr/>
+        </p:nvSpPr>
+        <p:spPr>
+          <a:xfrm>
+            <a:off x="6231038" y="1801172"/>
+            <a:ext cx="2834494" cy="307777"/>
+          </a:xfrm>
+          <a:prstGeom prst="rect">
+            <a:avLst/>
+          </a:prstGeom>
+          <a:noFill/>
+        </p:spPr>
+        <p:txBody>
+          <a:bodyPr wrap="none" rtlCol="0">
+            <a:spAutoFit/>
+          </a:bodyPr>
+          <a:lstStyle/>
+          <a:p>
+            <a:r>
+              <a:rPr lang="en-GB" sz="1400" dirty="0"/>
+              <a:t>all_outliers = outlier shared by all CZ</a:t>
+            </a:r>
+          </a:p>
+        </p:txBody>
+      </p:sp>
+      <p:sp>
+        <p:nvSpPr>
+          <p:cNvPr id="13" name="TextBox 12">
+            <a:extLst>
+              <a:ext uri="{FF2B5EF4-FFF2-40B4-BE49-F238E27FC236}">
+                <a16:creationId xmlns:a16="http://schemas.microsoft.com/office/drawing/2014/main" id="{E7AE7D32-9459-A144-A881-63F92D4E6C1F}"/>
+              </a:ext>
+            </a:extLst>
+          </p:cNvPr>
+          <p:cNvSpPr txBox="1"/>
+          <p:nvPr/>
+        </p:nvSpPr>
+        <p:spPr>
+          <a:xfrm>
+            <a:off x="838629" y="1157735"/>
+            <a:ext cx="5049011" cy="369332"/>
+          </a:xfrm>
+          <a:prstGeom prst="rect">
+            <a:avLst/>
+          </a:prstGeom>
+          <a:noFill/>
+        </p:spPr>
+        <p:txBody>
+          <a:bodyPr wrap="none" rtlCol="0">
+            <a:spAutoFit/>
+          </a:bodyPr>
+          <a:lstStyle/>
+          <a:p>
+            <a:pPr marL="285750" indent="-285750">
+              <a:buFont typeface="Arial" panose="020B0604020202020204" pitchFamily="34" charset="0"/>
+              <a:buChar char="•"/>
+            </a:pPr>
+            <a:r>
+              <a:rPr lang="en-GB" dirty="0"/>
+              <a:t>SNPs after all the filters and cline/outlier analysis</a:t>
+            </a:r>
+          </a:p>
+        </p:txBody>
+      </p:sp>
+    </p:spTree>
+    <p:extLst>
+      <p:ext uri="{BB962C8B-B14F-4D97-AF65-F5344CB8AC3E}">
+        <p14:creationId xmlns:p14="http://schemas.microsoft.com/office/powerpoint/2010/main" val="678544682"/>
+      </p:ext>
+    </p:extLst>
+  </p:cSld>
+  <p:clrMapOvr>
+    <a:masterClrMapping/>
+  </p:clrMapOvr>
+</p:sld>
+</file>
+
+<file path=ppt/slides/slide7.xml><?xml version="1.0" encoding="utf-8"?>
+<p:sld xmlns:a="http://schemas.openxmlformats.org/drawingml/2006/main" xmlns:r="http://schemas.openxmlformats.org/officeDocument/2006/relationships" xmlns:p="http://schemas.openxmlformats.org/presentationml/2006/main">
+  <p:cSld>
+    <p:spTree>
+      <p:nvGrpSpPr>
+        <p:cNvPr id="1" name=""/>
+        <p:cNvGrpSpPr/>
+        <p:nvPr/>
+      </p:nvGrpSpPr>
+      <p:grpSpPr>
+        <a:xfrm>
+          <a:off x="0" y="0"/>
+          <a:ext cx="0" cy="0"/>
+          <a:chOff x="0" y="0"/>
+          <a:chExt cx="0" cy="0"/>
+        </a:xfrm>
+      </p:grpSpPr>
+      <p:pic>
+        <p:nvPicPr>
+          <p:cNvPr id="3" name="Picture 2">
+            <a:extLst>
+              <a:ext uri="{FF2B5EF4-FFF2-40B4-BE49-F238E27FC236}">
+                <a16:creationId xmlns:a16="http://schemas.microsoft.com/office/drawing/2014/main" id="{5DEFEF38-FC25-AB4C-80F4-66DE30BC3B8F}"/>
+              </a:ext>
+            </a:extLst>
+          </p:cNvPr>
+          <p:cNvPicPr>
+            <a:picLocks noChangeAspect="1"/>
+          </p:cNvPicPr>
+          <p:nvPr/>
+        </p:nvPicPr>
+        <p:blipFill rotWithShape="1">
+          <a:blip r:embed="rId2"/>
+          <a:srcRect b="25739"/>
+          <a:stretch/>
+        </p:blipFill>
+        <p:spPr>
+          <a:xfrm>
+            <a:off x="1975432" y="739392"/>
+            <a:ext cx="8241136" cy="6120000"/>
+          </a:xfrm>
+          <a:prstGeom prst="rect">
+            <a:avLst/>
+          </a:prstGeom>
+        </p:spPr>
+      </p:pic>
+      <p:sp>
+        <p:nvSpPr>
+          <p:cNvPr id="4" name="TextBox 3">
+            <a:extLst>
+              <a:ext uri="{FF2B5EF4-FFF2-40B4-BE49-F238E27FC236}">
+                <a16:creationId xmlns:a16="http://schemas.microsoft.com/office/drawing/2014/main" id="{BBC0A1E3-8029-A149-9543-F9E009CEE386}"/>
+              </a:ext>
+            </a:extLst>
+          </p:cNvPr>
+          <p:cNvSpPr txBox="1"/>
+          <p:nvPr/>
+        </p:nvSpPr>
+        <p:spPr>
+          <a:xfrm>
+            <a:off x="5361216" y="277792"/>
+            <a:ext cx="1469569" cy="369332"/>
+          </a:xfrm>
+          <a:prstGeom prst="rect">
+            <a:avLst/>
+          </a:prstGeom>
+          <a:noFill/>
+        </p:spPr>
+        <p:txBody>
+          <a:bodyPr wrap="none" rtlCol="0">
+            <a:spAutoFit/>
+          </a:bodyPr>
+          <a:lstStyle/>
+          <a:p>
+            <a:r>
+              <a:rPr lang="en-GB" dirty="0"/>
+              <a:t>GATK SNP call</a:t>
+            </a:r>
+          </a:p>
+        </p:txBody>
+      </p:sp>
+      <p:sp>
+        <p:nvSpPr>
+          <p:cNvPr id="5" name="TextBox 4">
+            <a:extLst>
+              <a:ext uri="{FF2B5EF4-FFF2-40B4-BE49-F238E27FC236}">
+                <a16:creationId xmlns:a16="http://schemas.microsoft.com/office/drawing/2014/main" id="{321E6931-B8DB-3A49-849B-8FE2E1030096}"/>
+              </a:ext>
+            </a:extLst>
+          </p:cNvPr>
+          <p:cNvSpPr txBox="1"/>
+          <p:nvPr/>
+        </p:nvSpPr>
+        <p:spPr>
+          <a:xfrm>
+            <a:off x="7297304" y="4977113"/>
+            <a:ext cx="4522585" cy="923330"/>
+          </a:xfrm>
+          <a:prstGeom prst="rect">
+            <a:avLst/>
+          </a:prstGeom>
+          <a:noFill/>
+        </p:spPr>
+        <p:txBody>
+          <a:bodyPr wrap="square" rtlCol="0">
+            <a:spAutoFit/>
+          </a:bodyPr>
+          <a:lstStyle/>
+          <a:p>
+            <a:r>
+              <a:rPr lang="en-GB" dirty="0"/>
+              <a:t>Except this difference in the total number of SNPs, the map positions look quite similar but I have not run any statistical tests</a:t>
+            </a:r>
+          </a:p>
+        </p:txBody>
+      </p:sp>
+    </p:spTree>
+    <p:extLst>
+      <p:ext uri="{BB962C8B-B14F-4D97-AF65-F5344CB8AC3E}">
+        <p14:creationId xmlns:p14="http://schemas.microsoft.com/office/powerpoint/2010/main" val="2034600197"/>
+      </p:ext>
+    </p:extLst>
+  </p:cSld>
+  <p:clrMapOvr>
+    <a:masterClrMapping/>
+  </p:clrMapOvr>
+</p:sld>
+</file>
+
+<file path=ppt/slides/slide8.xml><?xml version="1.0" encoding="utf-8"?>
+<p:sld xmlns:a="http://schemas.openxmlformats.org/drawingml/2006/main" xmlns:r="http://schemas.openxmlformats.org/officeDocument/2006/relationships" xmlns:p="http://schemas.openxmlformats.org/presentationml/2006/main">
+  <p:cSld>
+    <p:spTree>
+      <p:nvGrpSpPr>
+        <p:cNvPr id="1" name=""/>
+        <p:cNvGrpSpPr/>
+        <p:nvPr/>
+      </p:nvGrpSpPr>
+      <p:grpSpPr>
+        <a:xfrm>
+          <a:off x="0" y="0"/>
+          <a:ext cx="0" cy="0"/>
+          <a:chOff x="0" y="0"/>
+          <a:chExt cx="0" cy="0"/>
+        </a:xfrm>
+      </p:grpSpPr>
+      <p:sp>
+        <p:nvSpPr>
           <p:cNvPr id="2" name="Rectangle 1">
             <a:extLst>
               <a:ext uri="{FF2B5EF4-FFF2-40B4-BE49-F238E27FC236}">
@@ -4270,263 +5366,6 @@
           </a:p>
         </p:txBody>
       </p:sp>
-      <p:sp>
-        <p:nvSpPr>
-          <p:cNvPr id="3" name="TextBox 2">
-            <a:extLst>
-              <a:ext uri="{FF2B5EF4-FFF2-40B4-BE49-F238E27FC236}">
-                <a16:creationId xmlns:a16="http://schemas.microsoft.com/office/drawing/2014/main" id="{6AF45C4C-3E49-344D-9302-96B66F645438}"/>
-              </a:ext>
-            </a:extLst>
-          </p:cNvPr>
-          <p:cNvSpPr txBox="1"/>
-          <p:nvPr/>
-        </p:nvSpPr>
-        <p:spPr>
-          <a:xfrm>
-            <a:off x="648183" y="2129742"/>
-            <a:ext cx="2426818" cy="369332"/>
-          </a:xfrm>
-          <a:prstGeom prst="rect">
-            <a:avLst/>
-          </a:prstGeom>
-          <a:noFill/>
-        </p:spPr>
-        <p:txBody>
-          <a:bodyPr wrap="none" rtlCol="0">
-            <a:spAutoFit/>
-          </a:bodyPr>
-          <a:lstStyle/>
-          <a:p>
-            <a:r>
-              <a:rPr lang="en-GB" dirty="0"/>
-              <a:t>Density of total markers</a:t>
-            </a:r>
-          </a:p>
-        </p:txBody>
-      </p:sp>
-      <p:sp>
-        <p:nvSpPr>
-          <p:cNvPr id="4" name="TextBox 3">
-            <a:extLst>
-              <a:ext uri="{FF2B5EF4-FFF2-40B4-BE49-F238E27FC236}">
-                <a16:creationId xmlns:a16="http://schemas.microsoft.com/office/drawing/2014/main" id="{716A47BA-6494-014A-8D52-66C78C05ABA1}"/>
-              </a:ext>
-            </a:extLst>
-          </p:cNvPr>
-          <p:cNvSpPr txBox="1"/>
-          <p:nvPr/>
-        </p:nvSpPr>
-        <p:spPr>
-          <a:xfrm>
-            <a:off x="3705829" y="2129742"/>
-            <a:ext cx="2667590" cy="369332"/>
-          </a:xfrm>
-          <a:prstGeom prst="rect">
-            <a:avLst/>
-          </a:prstGeom>
-          <a:noFill/>
-        </p:spPr>
-        <p:txBody>
-          <a:bodyPr wrap="none" rtlCol="0">
-            <a:spAutoFit/>
-          </a:bodyPr>
-          <a:lstStyle/>
-          <a:p>
-            <a:r>
-              <a:rPr lang="en-GB" dirty="0"/>
-              <a:t>Density of neutral markers</a:t>
-            </a:r>
-          </a:p>
-        </p:txBody>
-      </p:sp>
-      <p:sp>
-        <p:nvSpPr>
-          <p:cNvPr id="5" name="TextBox 4">
-            <a:extLst>
-              <a:ext uri="{FF2B5EF4-FFF2-40B4-BE49-F238E27FC236}">
-                <a16:creationId xmlns:a16="http://schemas.microsoft.com/office/drawing/2014/main" id="{74924E8F-9EB0-8848-8E8D-76305B227B64}"/>
-              </a:ext>
-            </a:extLst>
-          </p:cNvPr>
-          <p:cNvSpPr txBox="1"/>
-          <p:nvPr/>
-        </p:nvSpPr>
-        <p:spPr>
-          <a:xfrm>
-            <a:off x="6763475" y="2129742"/>
-            <a:ext cx="2614627" cy="369332"/>
-          </a:xfrm>
-          <a:prstGeom prst="rect">
-            <a:avLst/>
-          </a:prstGeom>
-          <a:noFill/>
-        </p:spPr>
-        <p:txBody>
-          <a:bodyPr wrap="none" rtlCol="0">
-            <a:spAutoFit/>
-          </a:bodyPr>
-          <a:lstStyle/>
-          <a:p>
-            <a:r>
-              <a:rPr lang="en-GB" dirty="0"/>
-              <a:t>Density of outlier markers</a:t>
-            </a:r>
-          </a:p>
-        </p:txBody>
-      </p:sp>
-      <mc:AlternateContent xmlns:mc="http://schemas.openxmlformats.org/markup-compatibility/2006">
-        <mc:Choice xmlns:a14="http://schemas.microsoft.com/office/drawing/2010/main" Requires="a14">
-          <p:sp>
-            <p:nvSpPr>
-              <p:cNvPr id="6" name="TextBox 5">
-                <a:extLst>
-                  <a:ext uri="{FF2B5EF4-FFF2-40B4-BE49-F238E27FC236}">
-                    <a16:creationId xmlns:a16="http://schemas.microsoft.com/office/drawing/2014/main" id="{C40B11A4-C5E2-4444-913B-7E300347554F}"/>
-                  </a:ext>
-                </a:extLst>
-              </p:cNvPr>
-              <p:cNvSpPr txBox="1"/>
-              <p:nvPr/>
-            </p:nvSpPr>
-            <p:spPr>
-              <a:xfrm>
-                <a:off x="648183" y="893633"/>
-                <a:ext cx="250966" cy="521233"/>
-              </a:xfrm>
-              <a:prstGeom prst="rect">
-                <a:avLst/>
-              </a:prstGeom>
-              <a:noFill/>
-            </p:spPr>
-            <p:txBody>
-              <a:bodyPr wrap="none" lIns="0" tIns="0" rIns="0" bIns="0" rtlCol="0">
-                <a:spAutoFit/>
-              </a:bodyPr>
-              <a:lstStyle/>
-              <a:p>
-                <a14:m>
-                  <m:oMathPara xmlns:m="http://schemas.openxmlformats.org/officeDocument/2006/math">
-                    <m:oMathParaPr>
-                      <m:jc m:val="centerGroup"/>
-                    </m:oMathParaPr>
-                    <m:oMath xmlns:m="http://schemas.openxmlformats.org/officeDocument/2006/math">
-                      <m:f>
-                        <m:fPr>
-                          <m:ctrlPr>
-                            <a:rPr lang="en-GB" i="1" smtClean="0">
-                              <a:latin typeface="Cambria Math" panose="02040503050406030204" pitchFamily="18" charset="0"/>
-                            </a:rPr>
-                          </m:ctrlPr>
-                        </m:fPr>
-                        <m:num>
-                          <m:sSub>
-                            <m:sSubPr>
-                              <m:ctrlPr>
-                                <a:rPr lang="en-GB" i="1" smtClean="0">
-                                  <a:latin typeface="Cambria Math" panose="02040503050406030204" pitchFamily="18" charset="0"/>
-                                </a:rPr>
-                              </m:ctrlPr>
-                            </m:sSubPr>
-                            <m:e>
-                              <m:r>
-                                <a:rPr lang="sv-SE" b="0" i="1" smtClean="0">
-                                  <a:latin typeface="Cambria Math" panose="02040503050406030204" pitchFamily="18" charset="0"/>
-                                </a:rPr>
-                                <m:t>𝑥</m:t>
-                              </m:r>
-                            </m:e>
-                            <m:sub>
-                              <m:r>
-                                <a:rPr lang="sv-SE" b="0" i="1" smtClean="0">
-                                  <a:latin typeface="Cambria Math" panose="02040503050406030204" pitchFamily="18" charset="0"/>
-                                </a:rPr>
-                                <m:t>𝑖</m:t>
-                              </m:r>
-                            </m:sub>
-                          </m:sSub>
-                        </m:num>
-                        <m:den>
-                          <m:sSub>
-                            <m:sSubPr>
-                              <m:ctrlPr>
-                                <a:rPr lang="en-GB" i="1" smtClean="0">
-                                  <a:latin typeface="Cambria Math" panose="02040503050406030204" pitchFamily="18" charset="0"/>
-                                </a:rPr>
-                              </m:ctrlPr>
-                            </m:sSubPr>
-                            <m:e>
-                              <m:r>
-                                <a:rPr lang="sv-SE" b="0" i="1" smtClean="0">
-                                  <a:latin typeface="Cambria Math" panose="02040503050406030204" pitchFamily="18" charset="0"/>
-                                </a:rPr>
-                                <m:t>𝐿</m:t>
-                              </m:r>
-                            </m:e>
-                            <m:sub>
-                              <m:r>
-                                <a:rPr lang="sv-SE" b="0" i="1" smtClean="0">
-                                  <a:latin typeface="Cambria Math" panose="02040503050406030204" pitchFamily="18" charset="0"/>
-                                </a:rPr>
-                                <m:t>𝑖</m:t>
-                              </m:r>
-                            </m:sub>
-                          </m:sSub>
-                        </m:den>
-                      </m:f>
-                    </m:oMath>
-                  </m:oMathPara>
-                </a14:m>
-                <a:endParaRPr lang="en-GB" dirty="0"/>
-              </a:p>
-            </p:txBody>
-          </p:sp>
-        </mc:Choice>
-        <mc:Fallback>
-          <p:sp>
-            <p:nvSpPr>
-              <p:cNvPr id="6" name="TextBox 5">
-                <a:extLst>
-                  <a:ext uri="{FF2B5EF4-FFF2-40B4-BE49-F238E27FC236}">
-                    <a16:creationId xmlns:a16="http://schemas.microsoft.com/office/drawing/2014/main" id="{C40B11A4-C5E2-4444-913B-7E300347554F}"/>
-                  </a:ext>
-                </a:extLst>
-              </p:cNvPr>
-              <p:cNvSpPr txBox="1">
-                <a:spLocks noRot="1" noChangeAspect="1" noMove="1" noResize="1" noEditPoints="1" noAdjustHandles="1" noChangeArrowheads="1" noChangeShapeType="1" noTextEdit="1"/>
-              </p:cNvSpPr>
-              <p:nvPr/>
-            </p:nvSpPr>
-            <p:spPr>
-              <a:xfrm>
-                <a:off x="648183" y="893633"/>
-                <a:ext cx="250966" cy="521233"/>
-              </a:xfrm>
-              <a:prstGeom prst="rect">
-                <a:avLst/>
-              </a:prstGeom>
-              <a:blipFill>
-                <a:blip r:embed="rId2"/>
-                <a:stretch>
-                  <a:fillRect l="-14286" r="-4762" b="-9524"/>
-                </a:stretch>
-              </a:blipFill>
-            </p:spPr>
-            <p:txBody>
-              <a:bodyPr/>
-              <a:lstStyle/>
-              <a:p>
-                <a:r>
-                  <a:rPr lang="en-GB">
-                    <a:noFill/>
-                  </a:rPr>
-                  <a:t> </a:t>
-                </a:r>
-              </a:p>
-            </p:txBody>
-          </p:sp>
-        </mc:Fallback>
-      </mc:AlternateContent>
       <mc:AlternateContent xmlns:mc="http://schemas.openxmlformats.org/markup-compatibility/2006">
         <mc:Choice xmlns:a14="http://schemas.microsoft.com/office/drawing/2010/main" Requires="a14">
           <p:sp>
@@ -4543,8 +5382,8 @@
             </p:nvSpPr>
             <p:spPr>
               <a:xfrm>
-                <a:off x="1374727" y="840220"/>
-                <a:ext cx="1700274" cy="525978"/>
+                <a:off x="206973" y="1443919"/>
+                <a:ext cx="1823769" cy="525913"/>
               </a:xfrm>
               <a:prstGeom prst="rect">
                 <a:avLst/>
@@ -4557,37 +5396,31 @@
               </a:bodyPr>
               <a:lstStyle/>
               <a:p>
+                <a:pPr/>
                 <a14:m>
                   <m:oMathPara xmlns:m="http://schemas.openxmlformats.org/officeDocument/2006/math">
                     <m:oMathParaPr>
                       <m:jc m:val="centerGroup"/>
                     </m:oMathParaPr>
                     <m:oMath xmlns:m="http://schemas.openxmlformats.org/officeDocument/2006/math">
-                      <m:sSub>
-                        <m:sSubPr>
-                          <m:ctrlPr>
-                            <a:rPr lang="sv-SE" b="0" i="1" smtClean="0">
-                              <a:latin typeface="Cambria Math" panose="02040503050406030204" pitchFamily="18" charset="0"/>
-                            </a:rPr>
-                          </m:ctrlPr>
-                        </m:sSubPr>
-                        <m:e>
-                          <m:r>
-                            <a:rPr lang="sv-SE" b="0" i="1" smtClean="0">
-                              <a:latin typeface="Cambria Math" panose="02040503050406030204" pitchFamily="18" charset="0"/>
-                            </a:rPr>
-                            <m:t>𝑥</m:t>
-                          </m:r>
-                        </m:e>
-                        <m:sub>
-                          <m:r>
-                            <a:rPr lang="sv-SE" b="0" i="1" smtClean="0">
-                              <a:latin typeface="Cambria Math" panose="02040503050406030204" pitchFamily="18" charset="0"/>
-                            </a:rPr>
-                            <m:t>𝑖</m:t>
-                          </m:r>
-                        </m:sub>
-                      </m:sSub>
+                      <m:r>
+                        <a:rPr lang="sv-SE" b="0" i="1" smtClean="0">
+                          <a:latin typeface="Cambria Math" panose="02040503050406030204" pitchFamily="18" charset="0"/>
+                        </a:rPr>
+                        <m:t>𝑛</m:t>
+                      </m:r>
+                      <m:r>
+                        <a:rPr lang="sv-SE" b="0" i="1" smtClean="0">
+                          <a:latin typeface="Cambria Math" panose="02040503050406030204" pitchFamily="18" charset="0"/>
+                        </a:rPr>
+                        <m:t>/</m:t>
+                      </m:r>
+                      <m:r>
+                        <a:rPr lang="sv-SE" b="0" i="1" smtClean="0">
+                          <a:latin typeface="Cambria Math" panose="02040503050406030204" pitchFamily="18" charset="0"/>
+                        </a:rPr>
+                        <m:t>𝑁</m:t>
+                      </m:r>
                       <m:r>
                         <a:rPr lang="sv-SE" b="0" i="1" smtClean="0">
                           <a:latin typeface="Cambria Math" panose="02040503050406030204" pitchFamily="18" charset="0"/>
@@ -4638,7 +5471,7 @@
                             <a:rPr lang="sv-SE" b="0" i="1" smtClean="0">
                               <a:latin typeface="Cambria Math" panose="02040503050406030204" pitchFamily="18" charset="0"/>
                             </a:rPr>
-                            <m:t>𝑚𝑎𝑟𝑘𝑒𝑟𝑠</m:t>
+                            <m:t>𝑚𝑎𝑟𝑘𝑒𝑟</m:t>
                           </m:r>
                         </m:num>
                         <m:den>
@@ -4658,7 +5491,7 @@
                             <a:rPr lang="sv-SE" b="0" i="1" smtClean="0">
                               <a:latin typeface="Cambria Math" panose="02040503050406030204" pitchFamily="18" charset="0"/>
                             </a:rPr>
-                            <m:t>𝑚𝑎𝑟𝑘𝑒𝑟𝑠</m:t>
+                            <m:t>𝑚𝑎𝑟𝑘𝑒𝑟</m:t>
                           </m:r>
                         </m:den>
                       </m:f>
@@ -4687,16 +5520,16 @@
             </p:nvSpPr>
             <p:spPr>
               <a:xfrm>
-                <a:off x="1374727" y="840220"/>
-                <a:ext cx="1700274" cy="525978"/>
+                <a:off x="206973" y="1443919"/>
+                <a:ext cx="1823769" cy="525913"/>
               </a:xfrm>
               <a:prstGeom prst="rect">
                 <a:avLst/>
               </a:prstGeom>
               <a:blipFill>
-                <a:blip r:embed="rId3"/>
+                <a:blip r:embed="rId2"/>
                 <a:stretch>
-                  <a:fillRect l="-1493" t="-6977" r="-2239" b="-27907"/>
+                  <a:fillRect l="-690" t="-7143" r="-2069" b="-30952"/>
                 </a:stretch>
               </a:blipFill>
             </p:spPr>
@@ -4719,10 +5552,10 @@
         <mc:Choice xmlns:a14="http://schemas.microsoft.com/office/drawing/2010/main" Requires="a14">
           <p:sp>
             <p:nvSpPr>
-              <p:cNvPr id="8" name="TextBox 7">
+              <p:cNvPr id="9" name="TextBox 8">
                 <a:extLst>
                   <a:ext uri="{FF2B5EF4-FFF2-40B4-BE49-F238E27FC236}">
-                    <a16:creationId xmlns:a16="http://schemas.microsoft.com/office/drawing/2014/main" id="{DCFA5F45-635D-8040-B09D-4BB9E939B896}"/>
+                    <a16:creationId xmlns:a16="http://schemas.microsoft.com/office/drawing/2014/main" id="{65F2AD20-DA4E-8F47-BBD7-064490A9231A}"/>
                   </a:ext>
                 </a:extLst>
               </p:cNvPr>
@@ -4731,8 +5564,224 @@
             </p:nvSpPr>
             <p:spPr>
               <a:xfrm>
-                <a:off x="3272378" y="964709"/>
-                <a:ext cx="6202082" cy="276999"/>
+                <a:off x="2239804" y="1408401"/>
+                <a:ext cx="3416192" cy="276999"/>
+              </a:xfrm>
+              <a:prstGeom prst="rect">
+                <a:avLst/>
+              </a:prstGeom>
+              <a:noFill/>
+            </p:spPr>
+            <p:txBody>
+              <a:bodyPr wrap="none" lIns="0" tIns="0" rIns="0" bIns="0" rtlCol="0">
+                <a:spAutoFit/>
+              </a:bodyPr>
+              <a:lstStyle/>
+              <a:p>
+                <a14:m>
+                  <m:oMathPara xmlns:m="http://schemas.openxmlformats.org/officeDocument/2006/math">
+                    <m:oMathParaPr>
+                      <m:jc m:val="centerGroup"/>
+                    </m:oMathParaPr>
+                    <m:oMath xmlns:m="http://schemas.openxmlformats.org/officeDocument/2006/math">
+                      <m:sSub>
+                        <m:sSubPr>
+                          <m:ctrlPr>
+                            <a:rPr lang="en-GB" i="1" smtClean="0">
+                              <a:latin typeface="Cambria Math" panose="02040503050406030204" pitchFamily="18" charset="0"/>
+                            </a:rPr>
+                          </m:ctrlPr>
+                        </m:sSubPr>
+                        <m:e>
+                          <m:r>
+                            <a:rPr lang="sv-SE" b="0" i="1" smtClean="0">
+                              <a:latin typeface="Cambria Math" panose="02040503050406030204" pitchFamily="18" charset="0"/>
+                            </a:rPr>
+                            <m:t>𝑛</m:t>
+                          </m:r>
+                        </m:e>
+                        <m:sub>
+                          <m:r>
+                            <a:rPr lang="sv-SE" b="0" i="1" smtClean="0">
+                              <a:latin typeface="Cambria Math" panose="02040503050406030204" pitchFamily="18" charset="0"/>
+                            </a:rPr>
+                            <m:t>𝑖</m:t>
+                          </m:r>
+                        </m:sub>
+                      </m:sSub>
+                      <m:r>
+                        <a:rPr lang="sv-SE" b="0" i="1" smtClean="0">
+                          <a:latin typeface="Cambria Math" panose="02040503050406030204" pitchFamily="18" charset="0"/>
+                        </a:rPr>
+                        <m:t>=</m:t>
+                      </m:r>
+                      <m:r>
+                        <m:rPr>
+                          <m:nor/>
+                        </m:rPr>
+                        <a:rPr lang="sv-SE" b="0" i="0" smtClean="0">
+                          <a:latin typeface="Cambria Math" panose="02040503050406030204" pitchFamily="18" charset="0"/>
+                        </a:rPr>
+                        <m:t>number</m:t>
+                      </m:r>
+                      <m:r>
+                        <m:rPr>
+                          <m:nor/>
+                        </m:rPr>
+                        <a:rPr lang="sv-SE" b="0" i="0" smtClean="0">
+                          <a:latin typeface="Cambria Math" panose="02040503050406030204" pitchFamily="18" charset="0"/>
+                        </a:rPr>
+                        <m:t> </m:t>
+                      </m:r>
+                      <m:r>
+                        <m:rPr>
+                          <m:nor/>
+                        </m:rPr>
+                        <a:rPr lang="sv-SE" b="0" i="0" smtClean="0">
+                          <a:latin typeface="Cambria Math" panose="02040503050406030204" pitchFamily="18" charset="0"/>
+                        </a:rPr>
+                        <m:t>of</m:t>
+                      </m:r>
+                      <m:r>
+                        <m:rPr>
+                          <m:nor/>
+                        </m:rPr>
+                        <a:rPr lang="sv-SE" b="0" i="0" smtClean="0">
+                          <a:latin typeface="Cambria Math" panose="02040503050406030204" pitchFamily="18" charset="0"/>
+                        </a:rPr>
+                        <m:t> </m:t>
+                      </m:r>
+                      <m:r>
+                        <m:rPr>
+                          <m:nor/>
+                        </m:rPr>
+                        <a:rPr lang="sv-SE" b="0" i="0" smtClean="0">
+                          <a:latin typeface="Cambria Math" panose="02040503050406030204" pitchFamily="18" charset="0"/>
+                        </a:rPr>
+                        <m:t>INDELs</m:t>
+                      </m:r>
+                      <m:r>
+                        <m:rPr>
+                          <m:nor/>
+                        </m:rPr>
+                        <a:rPr lang="sv-SE" b="0" i="0" smtClean="0">
+                          <a:latin typeface="Cambria Math" panose="02040503050406030204" pitchFamily="18" charset="0"/>
+                        </a:rPr>
+                        <m:t> </m:t>
+                      </m:r>
+                      <m:r>
+                        <m:rPr>
+                          <m:nor/>
+                        </m:rPr>
+                        <a:rPr lang="sv-SE" b="0" i="0" smtClean="0">
+                          <a:latin typeface="Cambria Math" panose="02040503050406030204" pitchFamily="18" charset="0"/>
+                        </a:rPr>
+                        <m:t>in</m:t>
+                      </m:r>
+                      <m:r>
+                        <m:rPr>
+                          <m:nor/>
+                        </m:rPr>
+                        <a:rPr lang="sv-SE" b="0" i="0" smtClean="0">
+                          <a:latin typeface="Cambria Math" panose="02040503050406030204" pitchFamily="18" charset="0"/>
+                        </a:rPr>
+                        <m:t> </m:t>
+                      </m:r>
+                      <m:r>
+                        <m:rPr>
+                          <m:nor/>
+                        </m:rPr>
+                        <a:rPr lang="sv-SE" b="0" i="0" smtClean="0">
+                          <a:latin typeface="Cambria Math" panose="02040503050406030204" pitchFamily="18" charset="0"/>
+                        </a:rPr>
+                        <m:t>contig</m:t>
+                      </m:r>
+                      <m:r>
+                        <m:rPr>
+                          <m:nor/>
+                        </m:rPr>
+                        <a:rPr lang="sv-SE" b="0" i="0" smtClean="0">
+                          <a:latin typeface="Cambria Math" panose="02040503050406030204" pitchFamily="18" charset="0"/>
+                        </a:rPr>
+                        <m:t> </m:t>
+                      </m:r>
+                      <m:r>
+                        <a:rPr lang="sv-SE" b="0" i="1" smtClean="0">
+                          <a:latin typeface="Cambria Math" panose="02040503050406030204" pitchFamily="18" charset="0"/>
+                        </a:rPr>
+                        <m:t>𝑖</m:t>
+                      </m:r>
+                    </m:oMath>
+                  </m:oMathPara>
+                </a14:m>
+                <a:endParaRPr lang="en-GB" dirty="0"/>
+              </a:p>
+            </p:txBody>
+          </p:sp>
+        </mc:Choice>
+        <mc:Fallback>
+          <p:sp>
+            <p:nvSpPr>
+              <p:cNvPr id="9" name="TextBox 8">
+                <a:extLst>
+                  <a:ext uri="{FF2B5EF4-FFF2-40B4-BE49-F238E27FC236}">
+                    <a16:creationId xmlns:a16="http://schemas.microsoft.com/office/drawing/2014/main" id="{65F2AD20-DA4E-8F47-BBD7-064490A9231A}"/>
+                  </a:ext>
+                </a:extLst>
+              </p:cNvPr>
+              <p:cNvSpPr txBox="1">
+                <a:spLocks noRot="1" noChangeAspect="1" noMove="1" noResize="1" noEditPoints="1" noAdjustHandles="1" noChangeArrowheads="1" noChangeShapeType="1" noTextEdit="1"/>
+              </p:cNvSpPr>
+              <p:nvPr/>
+            </p:nvSpPr>
+            <p:spPr>
+              <a:xfrm>
+                <a:off x="2239804" y="1408401"/>
+                <a:ext cx="3416192" cy="276999"/>
+              </a:xfrm>
+              <a:prstGeom prst="rect">
+                <a:avLst/>
+              </a:prstGeom>
+              <a:blipFill>
+                <a:blip r:embed="rId3"/>
+                <a:stretch>
+                  <a:fillRect l="-370" t="-8696" r="-741" b="-34783"/>
+                </a:stretch>
+              </a:blipFill>
+            </p:spPr>
+            <p:txBody>
+              <a:bodyPr/>
+              <a:lstStyle/>
+              <a:p>
+                <a:r>
+                  <a:rPr lang="en-GB">
+                    <a:noFill/>
+                  </a:rPr>
+                  <a:t> </a:t>
+                </a:r>
+              </a:p>
+            </p:txBody>
+          </p:sp>
+        </mc:Fallback>
+      </mc:AlternateContent>
+      <mc:AlternateContent xmlns:mc="http://schemas.openxmlformats.org/markup-compatibility/2006">
+        <mc:Choice xmlns:a14="http://schemas.microsoft.com/office/drawing/2010/main" Requires="a14">
+          <p:sp>
+            <p:nvSpPr>
+              <p:cNvPr id="10" name="TextBox 9">
+                <a:extLst>
+                  <a:ext uri="{FF2B5EF4-FFF2-40B4-BE49-F238E27FC236}">
+                    <a16:creationId xmlns:a16="http://schemas.microsoft.com/office/drawing/2014/main" id="{6342B62E-145E-0044-B612-F08CEA5E51C7}"/>
+                  </a:ext>
+                </a:extLst>
+              </p:cNvPr>
+              <p:cNvSpPr txBox="1"/>
+              <p:nvPr/>
+            </p:nvSpPr>
+            <p:spPr>
+              <a:xfrm>
+                <a:off x="2239804" y="1764750"/>
+                <a:ext cx="2892651" cy="276999"/>
               </a:xfrm>
               <a:prstGeom prst="rect">
                 <a:avLst/>
@@ -4755,7 +5804,7 @@
                         <a:rPr lang="sv-SE" b="0" i="1" smtClean="0">
                           <a:latin typeface="Cambria Math" panose="02040503050406030204" pitchFamily="18" charset="0"/>
                         </a:rPr>
-                        <m:t>𝑖</m:t>
+                        <m:t>𝑁</m:t>
                       </m:r>
                       <m:r>
                         <a:rPr lang="sv-SE" b="0" i="1" smtClean="0">
@@ -4770,69 +5819,12 @@
                         <a:rPr lang="sv-SE" b="0" i="0" smtClean="0">
                           <a:latin typeface="Cambria Math" panose="02040503050406030204" pitchFamily="18" charset="0"/>
                         </a:rPr>
-                        <m:t>contig</m:t>
-                      </m:r>
-                      <m:r>
-                        <a:rPr lang="sv-SE" b="0" i="0" smtClean="0">
-                          <a:latin typeface="Cambria Math" panose="02040503050406030204" pitchFamily="18" charset="0"/>
-                        </a:rPr>
-                        <m:t>;</m:t>
+                        <m:t>Total</m:t>
                       </m:r>
                       <m:r>
                         <m:rPr>
-                          <m:sty m:val="p"/>
+                          <m:nor/>
                         </m:rPr>
-                        <a:rPr lang="sv-SE" b="0" i="0" smtClean="0">
-                          <a:latin typeface="Cambria Math" panose="02040503050406030204" pitchFamily="18" charset="0"/>
-                        </a:rPr>
-                        <m:t>L</m:t>
-                      </m:r>
-                      <m:r>
-                        <a:rPr lang="sv-SE" b="0" i="0" smtClean="0">
-                          <a:latin typeface="Cambria Math" panose="02040503050406030204" pitchFamily="18" charset="0"/>
-                        </a:rPr>
-                        <m:t>=</m:t>
-                      </m:r>
-                      <m:r>
-                        <m:rPr>
-                          <m:sty m:val="p"/>
-                        </m:rPr>
-                        <a:rPr lang="sv-SE" b="0" i="0" smtClean="0">
-                          <a:latin typeface="Cambria Math" panose="02040503050406030204" pitchFamily="18" charset="0"/>
-                        </a:rPr>
-                        <m:t>length</m:t>
-                      </m:r>
-                      <m:r>
-                        <a:rPr lang="sv-SE" b="0" i="0" smtClean="0">
-                          <a:latin typeface="Cambria Math" panose="02040503050406030204" pitchFamily="18" charset="0"/>
-                        </a:rPr>
-                        <m:t>;</m:t>
-                      </m:r>
-                      <m:r>
-                        <m:rPr>
-                          <m:sty m:val="p"/>
-                        </m:rPr>
-                        <a:rPr lang="sv-SE" b="0" i="0" smtClean="0">
-                          <a:latin typeface="Cambria Math" panose="02040503050406030204" pitchFamily="18" charset="0"/>
-                        </a:rPr>
-                        <m:t>n</m:t>
-                      </m:r>
-                      <m:r>
-                        <a:rPr lang="sv-SE" b="0" i="0" smtClean="0">
-                          <a:latin typeface="Cambria Math" panose="02040503050406030204" pitchFamily="18" charset="0"/>
-                        </a:rPr>
-                        <m:t>=</m:t>
-                      </m:r>
-                      <m:r>
-                        <m:rPr>
-                          <m:sty m:val="p"/>
-                        </m:rPr>
-                        <a:rPr lang="sv-SE" b="0" i="0" smtClean="0">
-                          <a:latin typeface="Cambria Math" panose="02040503050406030204" pitchFamily="18" charset="0"/>
-                        </a:rPr>
-                        <m:t>relative</m:t>
-                      </m:r>
-                      <m:r>
                         <a:rPr lang="sv-SE" b="0" i="0" smtClean="0">
                           <a:latin typeface="Cambria Math" panose="02040503050406030204" pitchFamily="18" charset="0"/>
                         </a:rPr>
@@ -4840,7 +5832,7 @@
                       </m:r>
                       <m:r>
                         <m:rPr>
-                          <m:sty m:val="p"/>
+                          <m:nor/>
                         </m:rPr>
                         <a:rPr lang="sv-SE" b="0" i="0" smtClean="0">
                           <a:latin typeface="Cambria Math" panose="02040503050406030204" pitchFamily="18" charset="0"/>
@@ -4848,36 +5840,9 @@
                         <m:t>number</m:t>
                       </m:r>
                       <m:r>
-                        <a:rPr lang="sv-SE" b="0" i="0" smtClean="0">
-                          <a:latin typeface="Cambria Math" panose="02040503050406030204" pitchFamily="18" charset="0"/>
-                        </a:rPr>
-                        <m:t>;</m:t>
-                      </m:r>
-                      <m:r>
                         <m:rPr>
-                          <m:sty m:val="p"/>
+                          <m:nor/>
                         </m:rPr>
-                        <a:rPr lang="sv-SE" b="0" i="0" smtClean="0">
-                          <a:latin typeface="Cambria Math" panose="02040503050406030204" pitchFamily="18" charset="0"/>
-                        </a:rPr>
-                        <m:t>N</m:t>
-                      </m:r>
-                      <m:r>
-                        <a:rPr lang="sv-SE" b="0" i="0" smtClean="0">
-                          <a:latin typeface="Cambria Math" panose="02040503050406030204" pitchFamily="18" charset="0"/>
-                        </a:rPr>
-                        <m:t>=</m:t>
-                      </m:r>
-                      <m:r>
-                        <m:rPr>
-                          <m:sty m:val="p"/>
-                        </m:rPr>
-                        <a:rPr lang="sv-SE" b="0" i="0" smtClean="0">
-                          <a:latin typeface="Cambria Math" panose="02040503050406030204" pitchFamily="18" charset="0"/>
-                        </a:rPr>
-                        <m:t>total</m:t>
-                      </m:r>
-                      <m:r>
                         <a:rPr lang="sv-SE" b="0" i="0" smtClean="0">
                           <a:latin typeface="Cambria Math" panose="02040503050406030204" pitchFamily="18" charset="0"/>
                         </a:rPr>
@@ -4885,12 +5850,30 @@
                       </m:r>
                       <m:r>
                         <m:rPr>
-                          <m:sty m:val="p"/>
+                          <m:nor/>
                         </m:rPr>
                         <a:rPr lang="sv-SE" b="0" i="0" smtClean="0">
                           <a:latin typeface="Cambria Math" panose="02040503050406030204" pitchFamily="18" charset="0"/>
                         </a:rPr>
-                        <m:t>number</m:t>
+                        <m:t>of</m:t>
+                      </m:r>
+                      <m:r>
+                        <m:rPr>
+                          <m:nor/>
+                        </m:rPr>
+                        <a:rPr lang="sv-SE" b="0" i="0" smtClean="0">
+                          <a:latin typeface="Cambria Math" panose="02040503050406030204" pitchFamily="18" charset="0"/>
+                        </a:rPr>
+                        <m:t> </m:t>
+                      </m:r>
+                      <m:r>
+                        <m:rPr>
+                          <m:nor/>
+                        </m:rPr>
+                        <a:rPr lang="sv-SE" b="0" i="0" smtClean="0">
+                          <a:latin typeface="Cambria Math" panose="02040503050406030204" pitchFamily="18" charset="0"/>
+                        </a:rPr>
+                        <m:t>INDELs</m:t>
                       </m:r>
                     </m:oMath>
                   </m:oMathPara>
@@ -4903,10 +5886,10 @@
         <mc:Fallback>
           <p:sp>
             <p:nvSpPr>
-              <p:cNvPr id="8" name="TextBox 7">
+              <p:cNvPr id="10" name="TextBox 9">
                 <a:extLst>
                   <a:ext uri="{FF2B5EF4-FFF2-40B4-BE49-F238E27FC236}">
-                    <a16:creationId xmlns:a16="http://schemas.microsoft.com/office/drawing/2014/main" id="{DCFA5F45-635D-8040-B09D-4BB9E939B896}"/>
+                    <a16:creationId xmlns:a16="http://schemas.microsoft.com/office/drawing/2014/main" id="{6342B62E-145E-0044-B612-F08CEA5E51C7}"/>
                   </a:ext>
                 </a:extLst>
               </p:cNvPr>
@@ -4917,8 +5900,8 @@
             </p:nvSpPr>
             <p:spPr>
               <a:xfrm>
-                <a:off x="3272378" y="964709"/>
-                <a:ext cx="6202082" cy="276999"/>
+                <a:off x="2239804" y="1764750"/>
+                <a:ext cx="2892651" cy="276999"/>
               </a:xfrm>
               <a:prstGeom prst="rect">
                 <a:avLst/>
@@ -4926,7 +5909,7 @@
               <a:blipFill>
                 <a:blip r:embed="rId4"/>
                 <a:stretch>
-                  <a:fillRect t="-4348" b="-34783"/>
+                  <a:fillRect l="-873" t="-4348" r="-1310" b="-30435"/>
                 </a:stretch>
               </a:blipFill>
             </p:spPr>
@@ -4945,10 +5928,908 @@
           </p:sp>
         </mc:Fallback>
       </mc:AlternateContent>
+      <p:sp>
+        <p:nvSpPr>
+          <p:cNvPr id="12" name="TextBox 11">
+            <a:extLst>
+              <a:ext uri="{FF2B5EF4-FFF2-40B4-BE49-F238E27FC236}">
+                <a16:creationId xmlns:a16="http://schemas.microsoft.com/office/drawing/2014/main" id="{EE2B360A-DD67-7142-A309-F624C4AD0FFE}"/>
+              </a:ext>
+            </a:extLst>
+          </p:cNvPr>
+          <p:cNvSpPr txBox="1"/>
+          <p:nvPr/>
+        </p:nvSpPr>
+        <p:spPr>
+          <a:xfrm>
+            <a:off x="528115" y="811350"/>
+            <a:ext cx="3270447" cy="369332"/>
+          </a:xfrm>
+          <a:prstGeom prst="rect">
+            <a:avLst/>
+          </a:prstGeom>
+          <a:noFill/>
+        </p:spPr>
+        <p:txBody>
+          <a:bodyPr wrap="none" rtlCol="0">
+            <a:spAutoFit/>
+          </a:bodyPr>
+          <a:lstStyle/>
+          <a:p>
+            <a:pPr marL="285750" indent="-285750">
+              <a:buFont typeface="Arial" panose="020B0604020202020204" pitchFamily="34" charset="0"/>
+              <a:buChar char="•"/>
+            </a:pPr>
+            <a:r>
+              <a:rPr lang="en-GB" dirty="0"/>
+              <a:t>All INDELs = clinal + non-clinal</a:t>
+            </a:r>
+          </a:p>
+        </p:txBody>
+      </p:sp>
+      <p:pic>
+        <p:nvPicPr>
+          <p:cNvPr id="18" name="Picture 17">
+            <a:extLst>
+              <a:ext uri="{FF2B5EF4-FFF2-40B4-BE49-F238E27FC236}">
+                <a16:creationId xmlns:a16="http://schemas.microsoft.com/office/drawing/2014/main" id="{3A6E1AE8-CC84-5D43-8042-501E7887701C}"/>
+              </a:ext>
+            </a:extLst>
+          </p:cNvPr>
+          <p:cNvPicPr>
+            <a:picLocks noChangeAspect="1"/>
+          </p:cNvPicPr>
+          <p:nvPr/>
+        </p:nvPicPr>
+        <p:blipFill>
+          <a:blip r:embed="rId5"/>
+          <a:stretch>
+            <a:fillRect/>
+          </a:stretch>
+        </p:blipFill>
+        <p:spPr>
+          <a:xfrm>
+            <a:off x="89627" y="2041749"/>
+            <a:ext cx="5960697" cy="3960000"/>
+          </a:xfrm>
+          <a:prstGeom prst="rect">
+            <a:avLst/>
+          </a:prstGeom>
+        </p:spPr>
+      </p:pic>
+      <p:pic>
+        <p:nvPicPr>
+          <p:cNvPr id="20" name="Picture 19">
+            <a:extLst>
+              <a:ext uri="{FF2B5EF4-FFF2-40B4-BE49-F238E27FC236}">
+                <a16:creationId xmlns:a16="http://schemas.microsoft.com/office/drawing/2014/main" id="{90670FAE-1DA9-3946-84FF-21B14E688E33}"/>
+              </a:ext>
+            </a:extLst>
+          </p:cNvPr>
+          <p:cNvPicPr>
+            <a:picLocks noChangeAspect="1"/>
+          </p:cNvPicPr>
+          <p:nvPr/>
+        </p:nvPicPr>
+        <p:blipFill>
+          <a:blip r:embed="rId6"/>
+          <a:stretch>
+            <a:fillRect/>
+          </a:stretch>
+        </p:blipFill>
+        <p:spPr>
+          <a:xfrm>
+            <a:off x="6166082" y="2041749"/>
+            <a:ext cx="5960697" cy="3960000"/>
+          </a:xfrm>
+          <a:prstGeom prst="rect">
+            <a:avLst/>
+          </a:prstGeom>
+        </p:spPr>
+      </p:pic>
+      <p:sp>
+        <p:nvSpPr>
+          <p:cNvPr id="21" name="TextBox 20">
+            <a:extLst>
+              <a:ext uri="{FF2B5EF4-FFF2-40B4-BE49-F238E27FC236}">
+                <a16:creationId xmlns:a16="http://schemas.microsoft.com/office/drawing/2014/main" id="{EB528DF0-ED52-C643-A25D-EE710F3E6CF2}"/>
+              </a:ext>
+            </a:extLst>
+          </p:cNvPr>
+          <p:cNvSpPr txBox="1"/>
+          <p:nvPr/>
+        </p:nvSpPr>
+        <p:spPr>
+          <a:xfrm>
+            <a:off x="89627" y="6090207"/>
+            <a:ext cx="6382132" cy="369332"/>
+          </a:xfrm>
+          <a:prstGeom prst="rect">
+            <a:avLst/>
+          </a:prstGeom>
+          <a:noFill/>
+        </p:spPr>
+        <p:txBody>
+          <a:bodyPr wrap="none" rtlCol="0">
+            <a:spAutoFit/>
+          </a:bodyPr>
+          <a:lstStyle/>
+          <a:p>
+            <a:r>
+              <a:rPr lang="en-GB" i="1" dirty="0"/>
+              <a:t>Figure 1. Proportions (left) and counts (right) of INDELs per contig.</a:t>
+            </a:r>
+          </a:p>
+        </p:txBody>
+      </p:sp>
     </p:spTree>
     <p:extLst>
       <p:ext uri="{BB962C8B-B14F-4D97-AF65-F5344CB8AC3E}">
         <p14:creationId xmlns:p14="http://schemas.microsoft.com/office/powerpoint/2010/main" val="2585403068"/>
+      </p:ext>
+    </p:extLst>
+  </p:cSld>
+  <p:clrMapOvr>
+    <a:masterClrMapping/>
+  </p:clrMapOvr>
+</p:sld>
+</file>
+
+<file path=ppt/slides/slide9.xml><?xml version="1.0" encoding="utf-8"?>
+<p:sld xmlns:a="http://schemas.openxmlformats.org/drawingml/2006/main" xmlns:r="http://schemas.openxmlformats.org/officeDocument/2006/relationships" xmlns:p="http://schemas.openxmlformats.org/presentationml/2006/main">
+  <p:cSld>
+    <p:spTree>
+      <p:nvGrpSpPr>
+        <p:cNvPr id="1" name=""/>
+        <p:cNvGrpSpPr/>
+        <p:nvPr/>
+      </p:nvGrpSpPr>
+      <p:grpSpPr>
+        <a:xfrm>
+          <a:off x="0" y="0"/>
+          <a:ext cx="0" cy="0"/>
+          <a:chOff x="0" y="0"/>
+          <a:chExt cx="0" cy="0"/>
+        </a:xfrm>
+      </p:grpSpPr>
+      <p:sp>
+        <p:nvSpPr>
+          <p:cNvPr id="2" name="Rectangle 1">
+            <a:extLst>
+              <a:ext uri="{FF2B5EF4-FFF2-40B4-BE49-F238E27FC236}">
+                <a16:creationId xmlns:a16="http://schemas.microsoft.com/office/drawing/2014/main" id="{28EB9195-3465-C644-B592-B32C34D4FFCF}"/>
+              </a:ext>
+            </a:extLst>
+          </p:cNvPr>
+          <p:cNvSpPr/>
+          <p:nvPr/>
+        </p:nvSpPr>
+        <p:spPr>
+          <a:xfrm>
+            <a:off x="528115" y="409596"/>
+            <a:ext cx="4088812" cy="369332"/>
+          </a:xfrm>
+          <a:prstGeom prst="rect">
+            <a:avLst/>
+          </a:prstGeom>
+        </p:spPr>
+        <p:txBody>
+          <a:bodyPr wrap="none">
+            <a:spAutoFit/>
+          </a:bodyPr>
+          <a:lstStyle/>
+          <a:p>
+            <a:pPr marL="342900" indent="-342900">
+              <a:buFont typeface="+mj-lt"/>
+              <a:buAutoNum type="arabicPeriod" startAt="2"/>
+            </a:pPr>
+            <a:r>
+              <a:rPr lang="en-GB" dirty="0"/>
+              <a:t>Clustering of (different types) markers</a:t>
+            </a:r>
+          </a:p>
+        </p:txBody>
+      </p:sp>
+      <mc:AlternateContent xmlns:mc="http://schemas.openxmlformats.org/markup-compatibility/2006">
+        <mc:Choice xmlns:a14="http://schemas.microsoft.com/office/drawing/2010/main" Requires="a14">
+          <p:sp>
+            <p:nvSpPr>
+              <p:cNvPr id="7" name="TextBox 6">
+                <a:extLst>
+                  <a:ext uri="{FF2B5EF4-FFF2-40B4-BE49-F238E27FC236}">
+                    <a16:creationId xmlns:a16="http://schemas.microsoft.com/office/drawing/2014/main" id="{B0082A03-EA58-CA4D-8F3E-8226862CB7E3}"/>
+                  </a:ext>
+                </a:extLst>
+              </p:cNvPr>
+              <p:cNvSpPr txBox="1"/>
+              <p:nvPr/>
+            </p:nvSpPr>
+            <p:spPr>
+              <a:xfrm>
+                <a:off x="146150" y="1464702"/>
+                <a:ext cx="1823769" cy="525913"/>
+              </a:xfrm>
+              <a:prstGeom prst="rect">
+                <a:avLst/>
+              </a:prstGeom>
+              <a:noFill/>
+            </p:spPr>
+            <p:txBody>
+              <a:bodyPr wrap="none" lIns="0" tIns="0" rIns="0" bIns="0" rtlCol="0">
+                <a:spAutoFit/>
+              </a:bodyPr>
+              <a:lstStyle/>
+              <a:p>
+                <a:pPr/>
+                <a14:m>
+                  <m:oMathPara xmlns:m="http://schemas.openxmlformats.org/officeDocument/2006/math">
+                    <m:oMathParaPr>
+                      <m:jc m:val="centerGroup"/>
+                    </m:oMathParaPr>
+                    <m:oMath xmlns:m="http://schemas.openxmlformats.org/officeDocument/2006/math">
+                      <m:r>
+                        <a:rPr lang="sv-SE" b="0" i="1" smtClean="0">
+                          <a:latin typeface="Cambria Math" panose="02040503050406030204" pitchFamily="18" charset="0"/>
+                        </a:rPr>
+                        <m:t>𝑛</m:t>
+                      </m:r>
+                      <m:r>
+                        <a:rPr lang="sv-SE" b="0" i="1" smtClean="0">
+                          <a:latin typeface="Cambria Math" panose="02040503050406030204" pitchFamily="18" charset="0"/>
+                        </a:rPr>
+                        <m:t>/</m:t>
+                      </m:r>
+                      <m:r>
+                        <a:rPr lang="sv-SE" b="0" i="1" smtClean="0">
+                          <a:latin typeface="Cambria Math" panose="02040503050406030204" pitchFamily="18" charset="0"/>
+                        </a:rPr>
+                        <m:t>𝑁</m:t>
+                      </m:r>
+                      <m:r>
+                        <a:rPr lang="sv-SE" b="0" i="1" smtClean="0">
+                          <a:latin typeface="Cambria Math" panose="02040503050406030204" pitchFamily="18" charset="0"/>
+                        </a:rPr>
+                        <m:t>=</m:t>
+                      </m:r>
+                      <m:f>
+                        <m:fPr>
+                          <m:ctrlPr>
+                            <a:rPr lang="sv-SE" b="0" i="1" smtClean="0">
+                              <a:latin typeface="Cambria Math" panose="02040503050406030204" pitchFamily="18" charset="0"/>
+                            </a:rPr>
+                          </m:ctrlPr>
+                        </m:fPr>
+                        <m:num>
+                          <m:sSub>
+                            <m:sSubPr>
+                              <m:ctrlPr>
+                                <a:rPr lang="sv-SE" b="0" i="1" smtClean="0">
+                                  <a:latin typeface="Cambria Math" panose="02040503050406030204" pitchFamily="18" charset="0"/>
+                                </a:rPr>
+                              </m:ctrlPr>
+                            </m:sSubPr>
+                            <m:e>
+                              <m:r>
+                                <a:rPr lang="sv-SE" b="0" i="1" smtClean="0">
+                                  <a:latin typeface="Cambria Math" panose="02040503050406030204" pitchFamily="18" charset="0"/>
+                                </a:rPr>
+                                <m:t>𝑛</m:t>
+                              </m:r>
+                            </m:e>
+                            <m:sub>
+                              <m:r>
+                                <a:rPr lang="sv-SE" b="0" i="1" smtClean="0">
+                                  <a:latin typeface="Cambria Math" panose="02040503050406030204" pitchFamily="18" charset="0"/>
+                                </a:rPr>
+                                <m:t>𝑖</m:t>
+                              </m:r>
+                            </m:sub>
+                          </m:sSub>
+                          <m:r>
+                            <a:rPr lang="sv-SE" b="0" i="1" smtClean="0">
+                              <a:latin typeface="Cambria Math" panose="02040503050406030204" pitchFamily="18" charset="0"/>
+                            </a:rPr>
+                            <m:t> </m:t>
+                          </m:r>
+                          <m:r>
+                            <a:rPr lang="sv-SE" b="0" i="1" smtClean="0">
+                              <a:latin typeface="Cambria Math" panose="02040503050406030204" pitchFamily="18" charset="0"/>
+                            </a:rPr>
+                            <m:t>𝑚𝑎𝑟𝑘𝑒𝑟</m:t>
+                          </m:r>
+                        </m:num>
+                        <m:den>
+                          <m:r>
+                            <a:rPr lang="sv-SE" b="0" i="1" smtClean="0">
+                              <a:latin typeface="Cambria Math" panose="02040503050406030204" pitchFamily="18" charset="0"/>
+                            </a:rPr>
+                            <m:t>𝑁</m:t>
+                          </m:r>
+                          <m:r>
+                            <a:rPr lang="sv-SE" b="0" i="1" smtClean="0">
+                              <a:latin typeface="Cambria Math" panose="02040503050406030204" pitchFamily="18" charset="0"/>
+                            </a:rPr>
+                            <m:t> </m:t>
+                          </m:r>
+                          <m:r>
+                            <a:rPr lang="sv-SE" b="0" i="1" smtClean="0">
+                              <a:latin typeface="Cambria Math" panose="02040503050406030204" pitchFamily="18" charset="0"/>
+                            </a:rPr>
+                            <m:t>𝑚𝑎𝑟𝑘𝑒𝑟</m:t>
+                          </m:r>
+                        </m:den>
+                      </m:f>
+                    </m:oMath>
+                  </m:oMathPara>
+                </a14:m>
+                <a:endParaRPr lang="en-GB" dirty="0"/>
+              </a:p>
+            </p:txBody>
+          </p:sp>
+        </mc:Choice>
+        <mc:Fallback>
+          <p:sp>
+            <p:nvSpPr>
+              <p:cNvPr id="7" name="TextBox 6">
+                <a:extLst>
+                  <a:ext uri="{FF2B5EF4-FFF2-40B4-BE49-F238E27FC236}">
+                    <a16:creationId xmlns:a16="http://schemas.microsoft.com/office/drawing/2014/main" id="{B0082A03-EA58-CA4D-8F3E-8226862CB7E3}"/>
+                  </a:ext>
+                </a:extLst>
+              </p:cNvPr>
+              <p:cNvSpPr txBox="1">
+                <a:spLocks noRot="1" noChangeAspect="1" noMove="1" noResize="1" noEditPoints="1" noAdjustHandles="1" noChangeArrowheads="1" noChangeShapeType="1" noTextEdit="1"/>
+              </p:cNvSpPr>
+              <p:nvPr/>
+            </p:nvSpPr>
+            <p:spPr>
+              <a:xfrm>
+                <a:off x="146150" y="1464702"/>
+                <a:ext cx="1823769" cy="525913"/>
+              </a:xfrm>
+              <a:prstGeom prst="rect">
+                <a:avLst/>
+              </a:prstGeom>
+              <a:blipFill>
+                <a:blip r:embed="rId2"/>
+                <a:stretch>
+                  <a:fillRect l="-2098" t="-6977" r="-2098" b="-27907"/>
+                </a:stretch>
+              </a:blipFill>
+            </p:spPr>
+            <p:txBody>
+              <a:bodyPr/>
+              <a:lstStyle/>
+              <a:p>
+                <a:r>
+                  <a:rPr lang="en-GB">
+                    <a:noFill/>
+                  </a:rPr>
+                  <a:t> </a:t>
+                </a:r>
+              </a:p>
+            </p:txBody>
+          </p:sp>
+        </mc:Fallback>
+      </mc:AlternateContent>
+      <mc:AlternateContent xmlns:mc="http://schemas.openxmlformats.org/markup-compatibility/2006">
+        <mc:Choice xmlns:a14="http://schemas.microsoft.com/office/drawing/2010/main" Requires="a14">
+          <p:sp>
+            <p:nvSpPr>
+              <p:cNvPr id="9" name="TextBox 8">
+                <a:extLst>
+                  <a:ext uri="{FF2B5EF4-FFF2-40B4-BE49-F238E27FC236}">
+                    <a16:creationId xmlns:a16="http://schemas.microsoft.com/office/drawing/2014/main" id="{65F2AD20-DA4E-8F47-BBD7-064490A9231A}"/>
+                  </a:ext>
+                </a:extLst>
+              </p:cNvPr>
+              <p:cNvSpPr txBox="1"/>
+              <p:nvPr/>
+            </p:nvSpPr>
+            <p:spPr>
+              <a:xfrm>
+                <a:off x="2178981" y="1429184"/>
+                <a:ext cx="3175741" cy="276999"/>
+              </a:xfrm>
+              <a:prstGeom prst="rect">
+                <a:avLst/>
+              </a:prstGeom>
+              <a:noFill/>
+            </p:spPr>
+            <p:txBody>
+              <a:bodyPr wrap="none" lIns="0" tIns="0" rIns="0" bIns="0" rtlCol="0">
+                <a:spAutoFit/>
+              </a:bodyPr>
+              <a:lstStyle/>
+              <a:p>
+                <a14:m>
+                  <m:oMathPara xmlns:m="http://schemas.openxmlformats.org/officeDocument/2006/math">
+                    <m:oMathParaPr>
+                      <m:jc m:val="centerGroup"/>
+                    </m:oMathParaPr>
+                    <m:oMath xmlns:m="http://schemas.openxmlformats.org/officeDocument/2006/math">
+                      <m:sSub>
+                        <m:sSubPr>
+                          <m:ctrlPr>
+                            <a:rPr lang="en-GB" i="1" smtClean="0">
+                              <a:latin typeface="Cambria Math" panose="02040503050406030204" pitchFamily="18" charset="0"/>
+                            </a:rPr>
+                          </m:ctrlPr>
+                        </m:sSubPr>
+                        <m:e>
+                          <m:r>
+                            <a:rPr lang="sv-SE" b="0" i="1" smtClean="0">
+                              <a:latin typeface="Cambria Math" panose="02040503050406030204" pitchFamily="18" charset="0"/>
+                            </a:rPr>
+                            <m:t>𝑛</m:t>
+                          </m:r>
+                        </m:e>
+                        <m:sub>
+                          <m:r>
+                            <a:rPr lang="sv-SE" b="0" i="1" smtClean="0">
+                              <a:latin typeface="Cambria Math" panose="02040503050406030204" pitchFamily="18" charset="0"/>
+                            </a:rPr>
+                            <m:t>𝑖</m:t>
+                          </m:r>
+                        </m:sub>
+                      </m:sSub>
+                      <m:r>
+                        <a:rPr lang="sv-SE" b="0" i="1" smtClean="0">
+                          <a:latin typeface="Cambria Math" panose="02040503050406030204" pitchFamily="18" charset="0"/>
+                        </a:rPr>
+                        <m:t>=</m:t>
+                      </m:r>
+                      <m:r>
+                        <m:rPr>
+                          <m:nor/>
+                        </m:rPr>
+                        <a:rPr lang="sv-SE" b="0" i="0" smtClean="0">
+                          <a:latin typeface="Cambria Math" panose="02040503050406030204" pitchFamily="18" charset="0"/>
+                        </a:rPr>
+                        <m:t>number</m:t>
+                      </m:r>
+                      <m:r>
+                        <m:rPr>
+                          <m:nor/>
+                        </m:rPr>
+                        <a:rPr lang="sv-SE" b="0" i="0" smtClean="0">
+                          <a:latin typeface="Cambria Math" panose="02040503050406030204" pitchFamily="18" charset="0"/>
+                        </a:rPr>
+                        <m:t> </m:t>
+                      </m:r>
+                      <m:r>
+                        <m:rPr>
+                          <m:nor/>
+                        </m:rPr>
+                        <a:rPr lang="sv-SE" b="0" i="0" smtClean="0">
+                          <a:latin typeface="Cambria Math" panose="02040503050406030204" pitchFamily="18" charset="0"/>
+                        </a:rPr>
+                        <m:t>of</m:t>
+                      </m:r>
+                      <m:r>
+                        <m:rPr>
+                          <m:nor/>
+                        </m:rPr>
+                        <a:rPr lang="sv-SE" b="0" i="0" smtClean="0">
+                          <a:latin typeface="Cambria Math" panose="02040503050406030204" pitchFamily="18" charset="0"/>
+                        </a:rPr>
+                        <m:t> </m:t>
+                      </m:r>
+                      <m:r>
+                        <m:rPr>
+                          <m:nor/>
+                        </m:rPr>
+                        <a:rPr lang="sv-SE" b="0" i="0" smtClean="0">
+                          <a:latin typeface="Cambria Math" panose="02040503050406030204" pitchFamily="18" charset="0"/>
+                        </a:rPr>
+                        <m:t>SNPs</m:t>
+                      </m:r>
+                      <m:r>
+                        <m:rPr>
+                          <m:nor/>
+                        </m:rPr>
+                        <a:rPr lang="sv-SE" b="0" i="0" smtClean="0">
+                          <a:latin typeface="Cambria Math" panose="02040503050406030204" pitchFamily="18" charset="0"/>
+                        </a:rPr>
+                        <m:t> </m:t>
+                      </m:r>
+                      <m:r>
+                        <m:rPr>
+                          <m:nor/>
+                        </m:rPr>
+                        <a:rPr lang="sv-SE" b="0" i="0" smtClean="0">
+                          <a:latin typeface="Cambria Math" panose="02040503050406030204" pitchFamily="18" charset="0"/>
+                        </a:rPr>
+                        <m:t>in</m:t>
+                      </m:r>
+                      <m:r>
+                        <m:rPr>
+                          <m:nor/>
+                        </m:rPr>
+                        <a:rPr lang="sv-SE" b="0" i="0" smtClean="0">
+                          <a:latin typeface="Cambria Math" panose="02040503050406030204" pitchFamily="18" charset="0"/>
+                        </a:rPr>
+                        <m:t> </m:t>
+                      </m:r>
+                      <m:r>
+                        <m:rPr>
+                          <m:nor/>
+                        </m:rPr>
+                        <a:rPr lang="sv-SE" b="0" i="0" smtClean="0">
+                          <a:latin typeface="Cambria Math" panose="02040503050406030204" pitchFamily="18" charset="0"/>
+                        </a:rPr>
+                        <m:t>contig</m:t>
+                      </m:r>
+                      <m:r>
+                        <m:rPr>
+                          <m:nor/>
+                        </m:rPr>
+                        <a:rPr lang="sv-SE" b="0" i="0" smtClean="0">
+                          <a:latin typeface="Cambria Math" panose="02040503050406030204" pitchFamily="18" charset="0"/>
+                        </a:rPr>
+                        <m:t> </m:t>
+                      </m:r>
+                      <m:r>
+                        <a:rPr lang="sv-SE" b="0" i="1" smtClean="0">
+                          <a:latin typeface="Cambria Math" panose="02040503050406030204" pitchFamily="18" charset="0"/>
+                        </a:rPr>
+                        <m:t>𝑖</m:t>
+                      </m:r>
+                    </m:oMath>
+                  </m:oMathPara>
+                </a14:m>
+                <a:endParaRPr lang="en-GB" dirty="0"/>
+              </a:p>
+            </p:txBody>
+          </p:sp>
+        </mc:Choice>
+        <mc:Fallback>
+          <p:sp>
+            <p:nvSpPr>
+              <p:cNvPr id="9" name="TextBox 8">
+                <a:extLst>
+                  <a:ext uri="{FF2B5EF4-FFF2-40B4-BE49-F238E27FC236}">
+                    <a16:creationId xmlns:a16="http://schemas.microsoft.com/office/drawing/2014/main" id="{65F2AD20-DA4E-8F47-BBD7-064490A9231A}"/>
+                  </a:ext>
+                </a:extLst>
+              </p:cNvPr>
+              <p:cNvSpPr txBox="1">
+                <a:spLocks noRot="1" noChangeAspect="1" noMove="1" noResize="1" noEditPoints="1" noAdjustHandles="1" noChangeArrowheads="1" noChangeShapeType="1" noTextEdit="1"/>
+              </p:cNvSpPr>
+              <p:nvPr/>
+            </p:nvSpPr>
+            <p:spPr>
+              <a:xfrm>
+                <a:off x="2178981" y="1429184"/>
+                <a:ext cx="3175741" cy="276999"/>
+              </a:xfrm>
+              <a:prstGeom prst="rect">
+                <a:avLst/>
+              </a:prstGeom>
+              <a:blipFill>
+                <a:blip r:embed="rId3"/>
+                <a:stretch>
+                  <a:fillRect l="-797" t="-9091" r="-398" b="-36364"/>
+                </a:stretch>
+              </a:blipFill>
+            </p:spPr>
+            <p:txBody>
+              <a:bodyPr/>
+              <a:lstStyle/>
+              <a:p>
+                <a:r>
+                  <a:rPr lang="en-GB">
+                    <a:noFill/>
+                  </a:rPr>
+                  <a:t> </a:t>
+                </a:r>
+              </a:p>
+            </p:txBody>
+          </p:sp>
+        </mc:Fallback>
+      </mc:AlternateContent>
+      <mc:AlternateContent xmlns:mc="http://schemas.openxmlformats.org/markup-compatibility/2006">
+        <mc:Choice xmlns:a14="http://schemas.microsoft.com/office/drawing/2010/main" Requires="a14">
+          <p:sp>
+            <p:nvSpPr>
+              <p:cNvPr id="10" name="TextBox 9">
+                <a:extLst>
+                  <a:ext uri="{FF2B5EF4-FFF2-40B4-BE49-F238E27FC236}">
+                    <a16:creationId xmlns:a16="http://schemas.microsoft.com/office/drawing/2014/main" id="{6342B62E-145E-0044-B612-F08CEA5E51C7}"/>
+                  </a:ext>
+                </a:extLst>
+              </p:cNvPr>
+              <p:cNvSpPr txBox="1"/>
+              <p:nvPr/>
+            </p:nvSpPr>
+            <p:spPr>
+              <a:xfrm>
+                <a:off x="2178981" y="1785533"/>
+                <a:ext cx="2652201" cy="276999"/>
+              </a:xfrm>
+              <a:prstGeom prst="rect">
+                <a:avLst/>
+              </a:prstGeom>
+              <a:noFill/>
+            </p:spPr>
+            <p:txBody>
+              <a:bodyPr wrap="none" lIns="0" tIns="0" rIns="0" bIns="0" rtlCol="0">
+                <a:spAutoFit/>
+              </a:bodyPr>
+              <a:lstStyle/>
+              <a:p>
+                <a14:m>
+                  <m:oMathPara xmlns:m="http://schemas.openxmlformats.org/officeDocument/2006/math">
+                    <m:oMathParaPr>
+                      <m:jc m:val="centerGroup"/>
+                    </m:oMathParaPr>
+                    <m:oMath xmlns:m="http://schemas.openxmlformats.org/officeDocument/2006/math">
+                      <m:r>
+                        <a:rPr lang="sv-SE" b="0" i="1" smtClean="0">
+                          <a:latin typeface="Cambria Math" panose="02040503050406030204" pitchFamily="18" charset="0"/>
+                        </a:rPr>
+                        <m:t>𝑁</m:t>
+                      </m:r>
+                      <m:r>
+                        <a:rPr lang="sv-SE" b="0" i="1" smtClean="0">
+                          <a:latin typeface="Cambria Math" panose="02040503050406030204" pitchFamily="18" charset="0"/>
+                        </a:rPr>
+                        <m:t>=</m:t>
+                      </m:r>
+                      <m:r>
+                        <m:rPr>
+                          <m:nor/>
+                        </m:rPr>
+                        <a:rPr lang="sv-SE" b="0" i="0" smtClean="0">
+                          <a:latin typeface="Cambria Math" panose="02040503050406030204" pitchFamily="18" charset="0"/>
+                        </a:rPr>
+                        <m:t>Total</m:t>
+                      </m:r>
+                      <m:r>
+                        <m:rPr>
+                          <m:nor/>
+                        </m:rPr>
+                        <a:rPr lang="sv-SE" b="0" i="0" smtClean="0">
+                          <a:latin typeface="Cambria Math" panose="02040503050406030204" pitchFamily="18" charset="0"/>
+                        </a:rPr>
+                        <m:t> </m:t>
+                      </m:r>
+                      <m:r>
+                        <m:rPr>
+                          <m:nor/>
+                        </m:rPr>
+                        <a:rPr lang="sv-SE" b="0" i="0" smtClean="0">
+                          <a:latin typeface="Cambria Math" panose="02040503050406030204" pitchFamily="18" charset="0"/>
+                        </a:rPr>
+                        <m:t>number</m:t>
+                      </m:r>
+                      <m:r>
+                        <m:rPr>
+                          <m:nor/>
+                        </m:rPr>
+                        <a:rPr lang="sv-SE" b="0" i="0" smtClean="0">
+                          <a:latin typeface="Cambria Math" panose="02040503050406030204" pitchFamily="18" charset="0"/>
+                        </a:rPr>
+                        <m:t> </m:t>
+                      </m:r>
+                      <m:r>
+                        <m:rPr>
+                          <m:nor/>
+                        </m:rPr>
+                        <a:rPr lang="sv-SE" b="0" i="0" smtClean="0">
+                          <a:latin typeface="Cambria Math" panose="02040503050406030204" pitchFamily="18" charset="0"/>
+                        </a:rPr>
+                        <m:t>of</m:t>
+                      </m:r>
+                      <m:r>
+                        <m:rPr>
+                          <m:nor/>
+                        </m:rPr>
+                        <a:rPr lang="sv-SE" b="0" i="0" smtClean="0">
+                          <a:latin typeface="Cambria Math" panose="02040503050406030204" pitchFamily="18" charset="0"/>
+                        </a:rPr>
+                        <m:t> </m:t>
+                      </m:r>
+                      <m:r>
+                        <m:rPr>
+                          <m:nor/>
+                        </m:rPr>
+                        <a:rPr lang="sv-SE" b="0" i="0" smtClean="0">
+                          <a:latin typeface="Cambria Math" panose="02040503050406030204" pitchFamily="18" charset="0"/>
+                        </a:rPr>
+                        <m:t>SNPs</m:t>
+                      </m:r>
+                    </m:oMath>
+                  </m:oMathPara>
+                </a14:m>
+                <a:endParaRPr lang="en-GB" dirty="0"/>
+              </a:p>
+            </p:txBody>
+          </p:sp>
+        </mc:Choice>
+        <mc:Fallback>
+          <p:sp>
+            <p:nvSpPr>
+              <p:cNvPr id="10" name="TextBox 9">
+                <a:extLst>
+                  <a:ext uri="{FF2B5EF4-FFF2-40B4-BE49-F238E27FC236}">
+                    <a16:creationId xmlns:a16="http://schemas.microsoft.com/office/drawing/2014/main" id="{6342B62E-145E-0044-B612-F08CEA5E51C7}"/>
+                  </a:ext>
+                </a:extLst>
+              </p:cNvPr>
+              <p:cNvSpPr txBox="1">
+                <a:spLocks noRot="1" noChangeAspect="1" noMove="1" noResize="1" noEditPoints="1" noAdjustHandles="1" noChangeArrowheads="1" noChangeShapeType="1" noTextEdit="1"/>
+              </p:cNvSpPr>
+              <p:nvPr/>
+            </p:nvSpPr>
+            <p:spPr>
+              <a:xfrm>
+                <a:off x="2178981" y="1785533"/>
+                <a:ext cx="2652201" cy="276999"/>
+              </a:xfrm>
+              <a:prstGeom prst="rect">
+                <a:avLst/>
+              </a:prstGeom>
+              <a:blipFill>
+                <a:blip r:embed="rId4"/>
+                <a:stretch>
+                  <a:fillRect l="-1435" t="-9091" r="-1435" b="-36364"/>
+                </a:stretch>
+              </a:blipFill>
+            </p:spPr>
+            <p:txBody>
+              <a:bodyPr/>
+              <a:lstStyle/>
+              <a:p>
+                <a:r>
+                  <a:rPr lang="en-GB">
+                    <a:noFill/>
+                  </a:rPr>
+                  <a:t> </a:t>
+                </a:r>
+              </a:p>
+            </p:txBody>
+          </p:sp>
+        </mc:Fallback>
+      </mc:AlternateContent>
+      <p:sp>
+        <p:nvSpPr>
+          <p:cNvPr id="12" name="TextBox 11">
+            <a:extLst>
+              <a:ext uri="{FF2B5EF4-FFF2-40B4-BE49-F238E27FC236}">
+                <a16:creationId xmlns:a16="http://schemas.microsoft.com/office/drawing/2014/main" id="{EE2B360A-DD67-7142-A309-F624C4AD0FFE}"/>
+              </a:ext>
+            </a:extLst>
+          </p:cNvPr>
+          <p:cNvSpPr txBox="1"/>
+          <p:nvPr/>
+        </p:nvSpPr>
+        <p:spPr>
+          <a:xfrm>
+            <a:off x="528115" y="858278"/>
+            <a:ext cx="3080908" cy="369332"/>
+          </a:xfrm>
+          <a:prstGeom prst="rect">
+            <a:avLst/>
+          </a:prstGeom>
+          <a:noFill/>
+        </p:spPr>
+        <p:txBody>
+          <a:bodyPr wrap="none" rtlCol="0">
+            <a:spAutoFit/>
+          </a:bodyPr>
+          <a:lstStyle/>
+          <a:p>
+            <a:pPr marL="285750" indent="-285750">
+              <a:buFont typeface="Arial" panose="020B0604020202020204" pitchFamily="34" charset="0"/>
+              <a:buChar char="•"/>
+            </a:pPr>
+            <a:r>
+              <a:rPr lang="en-GB" dirty="0"/>
+              <a:t>All SNPs = clinal + non-clinal</a:t>
+            </a:r>
+          </a:p>
+        </p:txBody>
+      </p:sp>
+      <p:pic>
+        <p:nvPicPr>
+          <p:cNvPr id="4" name="Picture 3">
+            <a:extLst>
+              <a:ext uri="{FF2B5EF4-FFF2-40B4-BE49-F238E27FC236}">
+                <a16:creationId xmlns:a16="http://schemas.microsoft.com/office/drawing/2014/main" id="{04DD2A22-19B5-F842-8D6E-BCE4E3C449E4}"/>
+              </a:ext>
+            </a:extLst>
+          </p:cNvPr>
+          <p:cNvPicPr>
+            <a:picLocks noChangeAspect="1"/>
+          </p:cNvPicPr>
+          <p:nvPr/>
+        </p:nvPicPr>
+        <p:blipFill>
+          <a:blip r:embed="rId5"/>
+          <a:stretch>
+            <a:fillRect/>
+          </a:stretch>
+        </p:blipFill>
+        <p:spPr>
+          <a:xfrm>
+            <a:off x="146150" y="2145915"/>
+            <a:ext cx="5960697" cy="3960000"/>
+          </a:xfrm>
+          <a:prstGeom prst="rect">
+            <a:avLst/>
+          </a:prstGeom>
+        </p:spPr>
+      </p:pic>
+      <p:pic>
+        <p:nvPicPr>
+          <p:cNvPr id="6" name="Picture 5">
+            <a:extLst>
+              <a:ext uri="{FF2B5EF4-FFF2-40B4-BE49-F238E27FC236}">
+                <a16:creationId xmlns:a16="http://schemas.microsoft.com/office/drawing/2014/main" id="{D6F6B9D0-6650-2B4B-886A-5E5A448D8A04}"/>
+              </a:ext>
+            </a:extLst>
+          </p:cNvPr>
+          <p:cNvPicPr>
+            <a:picLocks noChangeAspect="1"/>
+          </p:cNvPicPr>
+          <p:nvPr/>
+        </p:nvPicPr>
+        <p:blipFill>
+          <a:blip r:embed="rId6"/>
+          <a:stretch>
+            <a:fillRect/>
+          </a:stretch>
+        </p:blipFill>
+        <p:spPr>
+          <a:xfrm>
+            <a:off x="6150867" y="2145915"/>
+            <a:ext cx="5960697" cy="3960000"/>
+          </a:xfrm>
+          <a:prstGeom prst="rect">
+            <a:avLst/>
+          </a:prstGeom>
+        </p:spPr>
+      </p:pic>
+      <p:sp>
+        <p:nvSpPr>
+          <p:cNvPr id="13" name="TextBox 12">
+            <a:extLst>
+              <a:ext uri="{FF2B5EF4-FFF2-40B4-BE49-F238E27FC236}">
+                <a16:creationId xmlns:a16="http://schemas.microsoft.com/office/drawing/2014/main" id="{7329FC58-40F8-DB4D-8891-3BB44E562421}"/>
+              </a:ext>
+            </a:extLst>
+          </p:cNvPr>
+          <p:cNvSpPr txBox="1"/>
+          <p:nvPr/>
+        </p:nvSpPr>
+        <p:spPr>
+          <a:xfrm>
+            <a:off x="89627" y="6090207"/>
+            <a:ext cx="6162649" cy="369332"/>
+          </a:xfrm>
+          <a:prstGeom prst="rect">
+            <a:avLst/>
+          </a:prstGeom>
+          <a:noFill/>
+        </p:spPr>
+        <p:txBody>
+          <a:bodyPr wrap="none" rtlCol="0">
+            <a:spAutoFit/>
+          </a:bodyPr>
+          <a:lstStyle/>
+          <a:p>
+            <a:r>
+              <a:rPr lang="en-GB" i="1" dirty="0"/>
+              <a:t>Figure 2. Proportions (left) and counts (right) of SNPs per contig.</a:t>
+            </a:r>
+          </a:p>
+        </p:txBody>
+      </p:sp>
+    </p:spTree>
+    <p:extLst>
+      <p:ext uri="{BB962C8B-B14F-4D97-AF65-F5344CB8AC3E}">
+        <p14:creationId xmlns:p14="http://schemas.microsoft.com/office/powerpoint/2010/main" val="3260542583"/>
       </p:ext>
     </p:extLst>
   </p:cSld>

</xml_diff>

<commit_message>
figures indel-snp 5 cline parameters comparison
</commit_message>
<xml_diff>
--- a/short_genetic_variants/docs/short_indels.pptx
+++ b/short_genetic_variants/docs/short_indels.pptx
@@ -5,7 +5,7 @@
     <p:sldMasterId id="2147483648" r:id="rId1"/>
   </p:sldMasterIdLst>
   <p:notesMasterIdLst>
-    <p:notesMasterId r:id="rId22"/>
+    <p:notesMasterId r:id="rId26"/>
   </p:notesMasterIdLst>
   <p:sldIdLst>
     <p:sldId id="256" r:id="rId2"/>
@@ -28,6 +28,10 @@
     <p:sldId id="275" r:id="rId19"/>
     <p:sldId id="277" r:id="rId20"/>
     <p:sldId id="276" r:id="rId21"/>
+    <p:sldId id="278" r:id="rId22"/>
+    <p:sldId id="279" r:id="rId23"/>
+    <p:sldId id="280" r:id="rId24"/>
+    <p:sldId id="281" r:id="rId25"/>
   </p:sldIdLst>
   <p:sldSz cx="12192000" cy="6858000"/>
   <p:notesSz cx="6858000" cy="9144000"/>
@@ -9385,7 +9389,7 @@
         </p:nvSpPr>
         <p:spPr>
           <a:xfrm>
-            <a:off x="6428128" y="5469450"/>
+            <a:off x="6428128" y="6203775"/>
             <a:ext cx="5235757" cy="584775"/>
           </a:xfrm>
           <a:prstGeom prst="rect">
@@ -9401,13 +9405,8 @@
           <a:p>
             <a:r>
               <a:rPr lang="en-GB" sz="1600" i="1" dirty="0"/>
-              <a:t>Figure 8. Proportions of SNPs vs INDELs for a given range of cline centres </a:t>
-            </a:r>
-            <a:r>
-              <a:rPr lang="en-GB" sz="1600" i="1"/>
-              <a:t>(colours).</a:t>
-            </a:r>
-            <a:endParaRPr lang="en-GB" sz="1600" i="1" dirty="0"/>
+              <a:t>Figure 8. Proportions of SNPs vs INDELs for a given range of cline centres (colours).</a:t>
+            </a:r>
           </a:p>
         </p:txBody>
       </p:sp>
@@ -9415,6 +9414,878 @@
     <p:extLst>
       <p:ext uri="{BB962C8B-B14F-4D97-AF65-F5344CB8AC3E}">
         <p14:creationId xmlns:p14="http://schemas.microsoft.com/office/powerpoint/2010/main" val="2202225606"/>
+      </p:ext>
+    </p:extLst>
+  </p:cSld>
+  <p:clrMapOvr>
+    <a:masterClrMapping/>
+  </p:clrMapOvr>
+</p:sld>
+</file>
+
+<file path=ppt/slides/slide21.xml><?xml version="1.0" encoding="utf-8"?>
+<p:sld xmlns:a="http://schemas.openxmlformats.org/drawingml/2006/main" xmlns:r="http://schemas.openxmlformats.org/officeDocument/2006/relationships" xmlns:p="http://schemas.openxmlformats.org/presentationml/2006/main">
+  <p:cSld>
+    <p:spTree>
+      <p:nvGrpSpPr>
+        <p:cNvPr id="1" name=""/>
+        <p:cNvGrpSpPr/>
+        <p:nvPr/>
+      </p:nvGrpSpPr>
+      <p:grpSpPr>
+        <a:xfrm>
+          <a:off x="0" y="0"/>
+          <a:ext cx="0" cy="0"/>
+          <a:chOff x="0" y="0"/>
+          <a:chExt cx="0" cy="0"/>
+        </a:xfrm>
+      </p:grpSpPr>
+      <p:pic>
+        <p:nvPicPr>
+          <p:cNvPr id="6" name="Picture 5">
+            <a:extLst>
+              <a:ext uri="{FF2B5EF4-FFF2-40B4-BE49-F238E27FC236}">
+                <a16:creationId xmlns:a16="http://schemas.microsoft.com/office/drawing/2014/main" id="{EB0D1348-DB7B-4D45-BC6E-211E3CFB7534}"/>
+              </a:ext>
+            </a:extLst>
+          </p:cNvPr>
+          <p:cNvPicPr>
+            <a:picLocks noChangeAspect="1"/>
+          </p:cNvPicPr>
+          <p:nvPr/>
+        </p:nvPicPr>
+        <p:blipFill>
+          <a:blip r:embed="rId2"/>
+          <a:stretch>
+            <a:fillRect/>
+          </a:stretch>
+        </p:blipFill>
+        <p:spPr>
+          <a:xfrm>
+            <a:off x="528115" y="1074850"/>
+            <a:ext cx="8228572" cy="5760000"/>
+          </a:xfrm>
+          <a:prstGeom prst="rect">
+            <a:avLst/>
+          </a:prstGeom>
+        </p:spPr>
+      </p:pic>
+      <p:sp>
+        <p:nvSpPr>
+          <p:cNvPr id="2" name="Rectangle 1">
+            <a:extLst>
+              <a:ext uri="{FF2B5EF4-FFF2-40B4-BE49-F238E27FC236}">
+                <a16:creationId xmlns:a16="http://schemas.microsoft.com/office/drawing/2014/main" id="{D91655BD-4E82-BE49-A7CD-CA31E3AFCA3B}"/>
+              </a:ext>
+            </a:extLst>
+          </p:cNvPr>
+          <p:cNvSpPr/>
+          <p:nvPr/>
+        </p:nvSpPr>
+        <p:spPr>
+          <a:xfrm>
+            <a:off x="528115" y="409596"/>
+            <a:ext cx="5467587" cy="369332"/>
+          </a:xfrm>
+          <a:prstGeom prst="rect">
+            <a:avLst/>
+          </a:prstGeom>
+        </p:spPr>
+        <p:txBody>
+          <a:bodyPr wrap="none">
+            <a:spAutoFit/>
+          </a:bodyPr>
+          <a:lstStyle/>
+          <a:p>
+            <a:pPr marL="342900" indent="-342900">
+              <a:buFont typeface="+mj-lt"/>
+              <a:buAutoNum type="arabicPeriod" startAt="4"/>
+            </a:pPr>
+            <a:r>
+              <a:rPr lang="en-GB" b="1" dirty="0"/>
+              <a:t>Distributions of cline parameters - width (GATK call)</a:t>
+            </a:r>
+          </a:p>
+        </p:txBody>
+      </p:sp>
+      <p:sp>
+        <p:nvSpPr>
+          <p:cNvPr id="3" name="TextBox 2">
+            <a:extLst>
+              <a:ext uri="{FF2B5EF4-FFF2-40B4-BE49-F238E27FC236}">
+                <a16:creationId xmlns:a16="http://schemas.microsoft.com/office/drawing/2014/main" id="{E3C4FFF0-6162-7545-8DED-E90631255C50}"/>
+              </a:ext>
+            </a:extLst>
+          </p:cNvPr>
+          <p:cNvSpPr txBox="1"/>
+          <p:nvPr/>
+        </p:nvSpPr>
+        <p:spPr>
+          <a:xfrm>
+            <a:off x="6709458" y="409596"/>
+            <a:ext cx="6001639" cy="369332"/>
+          </a:xfrm>
+          <a:prstGeom prst="rect">
+            <a:avLst/>
+          </a:prstGeom>
+          <a:noFill/>
+        </p:spPr>
+        <p:txBody>
+          <a:bodyPr wrap="square" rtlCol="0">
+            <a:spAutoFit/>
+          </a:bodyPr>
+          <a:lstStyle/>
+          <a:p>
+            <a:pPr marL="285750" indent="-285750">
+              <a:buFont typeface="Arial" panose="020B0604020202020204" pitchFamily="34" charset="0"/>
+              <a:buChar char="•"/>
+            </a:pPr>
+            <a:r>
+              <a:rPr lang="en-GB" dirty="0"/>
+              <a:t>Clinal INDELs and SNPs.</a:t>
+            </a:r>
+          </a:p>
+        </p:txBody>
+      </p:sp>
+      <p:sp>
+        <p:nvSpPr>
+          <p:cNvPr id="4" name="TextBox 3">
+            <a:extLst>
+              <a:ext uri="{FF2B5EF4-FFF2-40B4-BE49-F238E27FC236}">
+                <a16:creationId xmlns:a16="http://schemas.microsoft.com/office/drawing/2014/main" id="{3E27703C-140A-0642-910C-7B09247141B0}"/>
+              </a:ext>
+            </a:extLst>
+          </p:cNvPr>
+          <p:cNvSpPr txBox="1"/>
+          <p:nvPr/>
+        </p:nvSpPr>
+        <p:spPr>
+          <a:xfrm>
+            <a:off x="6709458" y="809081"/>
+            <a:ext cx="3292824" cy="369332"/>
+          </a:xfrm>
+          <a:prstGeom prst="rect">
+            <a:avLst/>
+          </a:prstGeom>
+          <a:noFill/>
+        </p:spPr>
+        <p:txBody>
+          <a:bodyPr wrap="none" rtlCol="0">
+            <a:spAutoFit/>
+          </a:bodyPr>
+          <a:lstStyle/>
+          <a:p>
+            <a:pPr marL="285750" indent="-285750">
+              <a:buFont typeface="Arial" panose="020B0604020202020204" pitchFamily="34" charset="0"/>
+              <a:buChar char="•"/>
+            </a:pPr>
+            <a:r>
+              <a:rPr lang="en-GB" dirty="0"/>
+              <a:t>All six hybrid zones combined.</a:t>
+            </a:r>
+          </a:p>
+        </p:txBody>
+      </p:sp>
+      <p:sp>
+        <p:nvSpPr>
+          <p:cNvPr id="11" name="TextBox 10">
+            <a:extLst>
+              <a:ext uri="{FF2B5EF4-FFF2-40B4-BE49-F238E27FC236}">
+                <a16:creationId xmlns:a16="http://schemas.microsoft.com/office/drawing/2014/main" id="{0204D076-8329-5844-9B89-47D809811C38}"/>
+              </a:ext>
+            </a:extLst>
+          </p:cNvPr>
+          <p:cNvSpPr txBox="1"/>
+          <p:nvPr/>
+        </p:nvSpPr>
+        <p:spPr>
+          <a:xfrm>
+            <a:off x="8756687" y="6048919"/>
+            <a:ext cx="3292825" cy="830997"/>
+          </a:xfrm>
+          <a:prstGeom prst="rect">
+            <a:avLst/>
+          </a:prstGeom>
+          <a:noFill/>
+        </p:spPr>
+        <p:txBody>
+          <a:bodyPr wrap="square" rtlCol="0">
+            <a:spAutoFit/>
+          </a:bodyPr>
+          <a:lstStyle/>
+          <a:p>
+            <a:r>
+              <a:rPr lang="en-GB" sz="1600" i="1" dirty="0"/>
+              <a:t>Figure 9. Proportions of SNPs vs INDELs for a given range of cline widths (colours).</a:t>
+            </a:r>
+          </a:p>
+        </p:txBody>
+      </p:sp>
+    </p:spTree>
+    <p:extLst>
+      <p:ext uri="{BB962C8B-B14F-4D97-AF65-F5344CB8AC3E}">
+        <p14:creationId xmlns:p14="http://schemas.microsoft.com/office/powerpoint/2010/main" val="1703685879"/>
+      </p:ext>
+    </p:extLst>
+  </p:cSld>
+  <p:clrMapOvr>
+    <a:masterClrMapping/>
+  </p:clrMapOvr>
+</p:sld>
+</file>
+
+<file path=ppt/slides/slide22.xml><?xml version="1.0" encoding="utf-8"?>
+<p:sld xmlns:a="http://schemas.openxmlformats.org/drawingml/2006/main" xmlns:r="http://schemas.openxmlformats.org/officeDocument/2006/relationships" xmlns:p="http://schemas.openxmlformats.org/presentationml/2006/main">
+  <p:cSld>
+    <p:spTree>
+      <p:nvGrpSpPr>
+        <p:cNvPr id="1" name=""/>
+        <p:cNvGrpSpPr/>
+        <p:nvPr/>
+      </p:nvGrpSpPr>
+      <p:grpSpPr>
+        <a:xfrm>
+          <a:off x="0" y="0"/>
+          <a:ext cx="0" cy="0"/>
+          <a:chOff x="0" y="0"/>
+          <a:chExt cx="0" cy="0"/>
+        </a:xfrm>
+      </p:grpSpPr>
+      <p:pic>
+        <p:nvPicPr>
+          <p:cNvPr id="7" name="Picture 6">
+            <a:extLst>
+              <a:ext uri="{FF2B5EF4-FFF2-40B4-BE49-F238E27FC236}">
+                <a16:creationId xmlns:a16="http://schemas.microsoft.com/office/drawing/2014/main" id="{27F924E1-FEE8-9041-AB2A-34CCD9E090BA}"/>
+              </a:ext>
+            </a:extLst>
+          </p:cNvPr>
+          <p:cNvPicPr>
+            <a:picLocks noChangeAspect="1"/>
+          </p:cNvPicPr>
+          <p:nvPr/>
+        </p:nvPicPr>
+        <p:blipFill>
+          <a:blip r:embed="rId2"/>
+          <a:stretch>
+            <a:fillRect/>
+          </a:stretch>
+        </p:blipFill>
+        <p:spPr>
+          <a:xfrm>
+            <a:off x="528115" y="993747"/>
+            <a:ext cx="8228571" cy="5760000"/>
+          </a:xfrm>
+          <a:prstGeom prst="rect">
+            <a:avLst/>
+          </a:prstGeom>
+        </p:spPr>
+      </p:pic>
+      <p:sp>
+        <p:nvSpPr>
+          <p:cNvPr id="2" name="Rectangle 1">
+            <a:extLst>
+              <a:ext uri="{FF2B5EF4-FFF2-40B4-BE49-F238E27FC236}">
+                <a16:creationId xmlns:a16="http://schemas.microsoft.com/office/drawing/2014/main" id="{D91655BD-4E82-BE49-A7CD-CA31E3AFCA3B}"/>
+              </a:ext>
+            </a:extLst>
+          </p:cNvPr>
+          <p:cNvSpPr/>
+          <p:nvPr/>
+        </p:nvSpPr>
+        <p:spPr>
+          <a:xfrm>
+            <a:off x="528115" y="409596"/>
+            <a:ext cx="5422703" cy="369332"/>
+          </a:xfrm>
+          <a:prstGeom prst="rect">
+            <a:avLst/>
+          </a:prstGeom>
+        </p:spPr>
+        <p:txBody>
+          <a:bodyPr wrap="none">
+            <a:spAutoFit/>
+          </a:bodyPr>
+          <a:lstStyle/>
+          <a:p>
+            <a:pPr marL="342900" indent="-342900">
+              <a:buFont typeface="+mj-lt"/>
+              <a:buAutoNum type="arabicPeriod" startAt="4"/>
+            </a:pPr>
+            <a:r>
+              <a:rPr lang="en-GB" b="1" dirty="0"/>
+              <a:t>Distributions of cline parameters - slope (GATK call)</a:t>
+            </a:r>
+          </a:p>
+        </p:txBody>
+      </p:sp>
+      <p:sp>
+        <p:nvSpPr>
+          <p:cNvPr id="3" name="TextBox 2">
+            <a:extLst>
+              <a:ext uri="{FF2B5EF4-FFF2-40B4-BE49-F238E27FC236}">
+                <a16:creationId xmlns:a16="http://schemas.microsoft.com/office/drawing/2014/main" id="{E3C4FFF0-6162-7545-8DED-E90631255C50}"/>
+              </a:ext>
+            </a:extLst>
+          </p:cNvPr>
+          <p:cNvSpPr txBox="1"/>
+          <p:nvPr/>
+        </p:nvSpPr>
+        <p:spPr>
+          <a:xfrm>
+            <a:off x="6709458" y="409596"/>
+            <a:ext cx="6001639" cy="369332"/>
+          </a:xfrm>
+          <a:prstGeom prst="rect">
+            <a:avLst/>
+          </a:prstGeom>
+          <a:noFill/>
+        </p:spPr>
+        <p:txBody>
+          <a:bodyPr wrap="square" rtlCol="0">
+            <a:spAutoFit/>
+          </a:bodyPr>
+          <a:lstStyle/>
+          <a:p>
+            <a:pPr marL="285750" indent="-285750">
+              <a:buFont typeface="Arial" panose="020B0604020202020204" pitchFamily="34" charset="0"/>
+              <a:buChar char="•"/>
+            </a:pPr>
+            <a:r>
+              <a:rPr lang="en-GB" dirty="0"/>
+              <a:t>Clinal INDELs and SNPs.</a:t>
+            </a:r>
+          </a:p>
+        </p:txBody>
+      </p:sp>
+      <p:sp>
+        <p:nvSpPr>
+          <p:cNvPr id="4" name="TextBox 3">
+            <a:extLst>
+              <a:ext uri="{FF2B5EF4-FFF2-40B4-BE49-F238E27FC236}">
+                <a16:creationId xmlns:a16="http://schemas.microsoft.com/office/drawing/2014/main" id="{3E27703C-140A-0642-910C-7B09247141B0}"/>
+              </a:ext>
+            </a:extLst>
+          </p:cNvPr>
+          <p:cNvSpPr txBox="1"/>
+          <p:nvPr/>
+        </p:nvSpPr>
+        <p:spPr>
+          <a:xfrm>
+            <a:off x="6709458" y="809081"/>
+            <a:ext cx="3292824" cy="369332"/>
+          </a:xfrm>
+          <a:prstGeom prst="rect">
+            <a:avLst/>
+          </a:prstGeom>
+          <a:noFill/>
+        </p:spPr>
+        <p:txBody>
+          <a:bodyPr wrap="none" rtlCol="0">
+            <a:spAutoFit/>
+          </a:bodyPr>
+          <a:lstStyle/>
+          <a:p>
+            <a:pPr marL="285750" indent="-285750">
+              <a:buFont typeface="Arial" panose="020B0604020202020204" pitchFamily="34" charset="0"/>
+              <a:buChar char="•"/>
+            </a:pPr>
+            <a:r>
+              <a:rPr lang="en-GB" dirty="0"/>
+              <a:t>All six hybrid zones combined.</a:t>
+            </a:r>
+          </a:p>
+        </p:txBody>
+      </p:sp>
+      <p:sp>
+        <p:nvSpPr>
+          <p:cNvPr id="11" name="TextBox 10">
+            <a:extLst>
+              <a:ext uri="{FF2B5EF4-FFF2-40B4-BE49-F238E27FC236}">
+                <a16:creationId xmlns:a16="http://schemas.microsoft.com/office/drawing/2014/main" id="{0204D076-8329-5844-9B89-47D809811C38}"/>
+              </a:ext>
+            </a:extLst>
+          </p:cNvPr>
+          <p:cNvSpPr txBox="1"/>
+          <p:nvPr/>
+        </p:nvSpPr>
+        <p:spPr>
+          <a:xfrm>
+            <a:off x="5745952" y="5922750"/>
+            <a:ext cx="5446767" cy="584775"/>
+          </a:xfrm>
+          <a:prstGeom prst="rect">
+            <a:avLst/>
+          </a:prstGeom>
+          <a:noFill/>
+        </p:spPr>
+        <p:txBody>
+          <a:bodyPr wrap="square" rtlCol="0">
+            <a:spAutoFit/>
+          </a:bodyPr>
+          <a:lstStyle/>
+          <a:p>
+            <a:r>
+              <a:rPr lang="en-GB" sz="1600" i="1" dirty="0"/>
+              <a:t>Figure 10. Proportions of SNPs vs INDELs for a given range of cline slopes (colours).</a:t>
+            </a:r>
+          </a:p>
+        </p:txBody>
+      </p:sp>
+    </p:spTree>
+    <p:extLst>
+      <p:ext uri="{BB962C8B-B14F-4D97-AF65-F5344CB8AC3E}">
+        <p14:creationId xmlns:p14="http://schemas.microsoft.com/office/powerpoint/2010/main" val="3083649855"/>
+      </p:ext>
+    </p:extLst>
+  </p:cSld>
+  <p:clrMapOvr>
+    <a:masterClrMapping/>
+  </p:clrMapOvr>
+</p:sld>
+</file>
+
+<file path=ppt/slides/slide23.xml><?xml version="1.0" encoding="utf-8"?>
+<p:sld xmlns:a="http://schemas.openxmlformats.org/drawingml/2006/main" xmlns:r="http://schemas.openxmlformats.org/officeDocument/2006/relationships" xmlns:p="http://schemas.openxmlformats.org/presentationml/2006/main">
+  <p:cSld>
+    <p:spTree>
+      <p:nvGrpSpPr>
+        <p:cNvPr id="1" name=""/>
+        <p:cNvGrpSpPr/>
+        <p:nvPr/>
+      </p:nvGrpSpPr>
+      <p:grpSpPr>
+        <a:xfrm>
+          <a:off x="0" y="0"/>
+          <a:ext cx="0" cy="0"/>
+          <a:chOff x="0" y="0"/>
+          <a:chExt cx="0" cy="0"/>
+        </a:xfrm>
+      </p:grpSpPr>
+      <p:pic>
+        <p:nvPicPr>
+          <p:cNvPr id="6" name="Picture 5">
+            <a:extLst>
+              <a:ext uri="{FF2B5EF4-FFF2-40B4-BE49-F238E27FC236}">
+                <a16:creationId xmlns:a16="http://schemas.microsoft.com/office/drawing/2014/main" id="{71C83DEF-541B-2540-88D1-54ED2E49E36B}"/>
+              </a:ext>
+            </a:extLst>
+          </p:cNvPr>
+          <p:cNvPicPr>
+            <a:picLocks noChangeAspect="1"/>
+          </p:cNvPicPr>
+          <p:nvPr/>
+        </p:nvPicPr>
+        <p:blipFill>
+          <a:blip r:embed="rId2"/>
+          <a:stretch>
+            <a:fillRect/>
+          </a:stretch>
+        </p:blipFill>
+        <p:spPr>
+          <a:xfrm>
+            <a:off x="528115" y="993747"/>
+            <a:ext cx="8228571" cy="5760000"/>
+          </a:xfrm>
+          <a:prstGeom prst="rect">
+            <a:avLst/>
+          </a:prstGeom>
+        </p:spPr>
+      </p:pic>
+      <p:sp>
+        <p:nvSpPr>
+          <p:cNvPr id="2" name="Rectangle 1">
+            <a:extLst>
+              <a:ext uri="{FF2B5EF4-FFF2-40B4-BE49-F238E27FC236}">
+                <a16:creationId xmlns:a16="http://schemas.microsoft.com/office/drawing/2014/main" id="{D91655BD-4E82-BE49-A7CD-CA31E3AFCA3B}"/>
+              </a:ext>
+            </a:extLst>
+          </p:cNvPr>
+          <p:cNvSpPr/>
+          <p:nvPr/>
+        </p:nvSpPr>
+        <p:spPr>
+          <a:xfrm>
+            <a:off x="528115" y="409596"/>
+            <a:ext cx="5523692" cy="369332"/>
+          </a:xfrm>
+          <a:prstGeom prst="rect">
+            <a:avLst/>
+          </a:prstGeom>
+        </p:spPr>
+        <p:txBody>
+          <a:bodyPr wrap="none">
+            <a:spAutoFit/>
+          </a:bodyPr>
+          <a:lstStyle/>
+          <a:p>
+            <a:pPr marL="342900" indent="-342900">
+              <a:buFont typeface="+mj-lt"/>
+              <a:buAutoNum type="arabicPeriod" startAt="4"/>
+            </a:pPr>
+            <a:r>
+              <a:rPr lang="en-GB" b="1" dirty="0"/>
+              <a:t>Distributions of cline parameters – </a:t>
+            </a:r>
+            <a:r>
+              <a:rPr lang="en-GB" b="1" dirty="0" err="1"/>
+              <a:t>p_diff</a:t>
+            </a:r>
+            <a:r>
+              <a:rPr lang="en-GB" b="1" dirty="0"/>
+              <a:t> (GATK call)</a:t>
+            </a:r>
+          </a:p>
+        </p:txBody>
+      </p:sp>
+      <p:sp>
+        <p:nvSpPr>
+          <p:cNvPr id="3" name="TextBox 2">
+            <a:extLst>
+              <a:ext uri="{FF2B5EF4-FFF2-40B4-BE49-F238E27FC236}">
+                <a16:creationId xmlns:a16="http://schemas.microsoft.com/office/drawing/2014/main" id="{E3C4FFF0-6162-7545-8DED-E90631255C50}"/>
+              </a:ext>
+            </a:extLst>
+          </p:cNvPr>
+          <p:cNvSpPr txBox="1"/>
+          <p:nvPr/>
+        </p:nvSpPr>
+        <p:spPr>
+          <a:xfrm>
+            <a:off x="6709458" y="409596"/>
+            <a:ext cx="6001639" cy="369332"/>
+          </a:xfrm>
+          <a:prstGeom prst="rect">
+            <a:avLst/>
+          </a:prstGeom>
+          <a:noFill/>
+        </p:spPr>
+        <p:txBody>
+          <a:bodyPr wrap="square" rtlCol="0">
+            <a:spAutoFit/>
+          </a:bodyPr>
+          <a:lstStyle/>
+          <a:p>
+            <a:pPr marL="285750" indent="-285750">
+              <a:buFont typeface="Arial" panose="020B0604020202020204" pitchFamily="34" charset="0"/>
+              <a:buChar char="•"/>
+            </a:pPr>
+            <a:r>
+              <a:rPr lang="en-GB" dirty="0"/>
+              <a:t>Clinal INDELs and SNPs.</a:t>
+            </a:r>
+          </a:p>
+        </p:txBody>
+      </p:sp>
+      <p:sp>
+        <p:nvSpPr>
+          <p:cNvPr id="4" name="TextBox 3">
+            <a:extLst>
+              <a:ext uri="{FF2B5EF4-FFF2-40B4-BE49-F238E27FC236}">
+                <a16:creationId xmlns:a16="http://schemas.microsoft.com/office/drawing/2014/main" id="{3E27703C-140A-0642-910C-7B09247141B0}"/>
+              </a:ext>
+            </a:extLst>
+          </p:cNvPr>
+          <p:cNvSpPr txBox="1"/>
+          <p:nvPr/>
+        </p:nvSpPr>
+        <p:spPr>
+          <a:xfrm>
+            <a:off x="6709458" y="809081"/>
+            <a:ext cx="3292824" cy="369332"/>
+          </a:xfrm>
+          <a:prstGeom prst="rect">
+            <a:avLst/>
+          </a:prstGeom>
+          <a:noFill/>
+        </p:spPr>
+        <p:txBody>
+          <a:bodyPr wrap="none" rtlCol="0">
+            <a:spAutoFit/>
+          </a:bodyPr>
+          <a:lstStyle/>
+          <a:p>
+            <a:pPr marL="285750" indent="-285750">
+              <a:buFont typeface="Arial" panose="020B0604020202020204" pitchFamily="34" charset="0"/>
+              <a:buChar char="•"/>
+            </a:pPr>
+            <a:r>
+              <a:rPr lang="en-GB" dirty="0"/>
+              <a:t>All six hybrid zones combined.</a:t>
+            </a:r>
+          </a:p>
+        </p:txBody>
+      </p:sp>
+      <p:sp>
+        <p:nvSpPr>
+          <p:cNvPr id="11" name="TextBox 10">
+            <a:extLst>
+              <a:ext uri="{FF2B5EF4-FFF2-40B4-BE49-F238E27FC236}">
+                <a16:creationId xmlns:a16="http://schemas.microsoft.com/office/drawing/2014/main" id="{0204D076-8329-5844-9B89-47D809811C38}"/>
+              </a:ext>
+            </a:extLst>
+          </p:cNvPr>
+          <p:cNvSpPr txBox="1"/>
+          <p:nvPr/>
+        </p:nvSpPr>
+        <p:spPr>
+          <a:xfrm>
+            <a:off x="7736798" y="5922750"/>
+            <a:ext cx="4173551" cy="830997"/>
+          </a:xfrm>
+          <a:prstGeom prst="rect">
+            <a:avLst/>
+          </a:prstGeom>
+          <a:noFill/>
+        </p:spPr>
+        <p:txBody>
+          <a:bodyPr wrap="square" rtlCol="0">
+            <a:spAutoFit/>
+          </a:bodyPr>
+          <a:lstStyle/>
+          <a:p>
+            <a:r>
+              <a:rPr lang="en-GB" sz="1600" i="1" dirty="0"/>
+              <a:t>Figure 11. Proportions of SNPs vs INDELs for a given range of cline end frequencies difference (colours).</a:t>
+            </a:r>
+          </a:p>
+        </p:txBody>
+      </p:sp>
+    </p:spTree>
+    <p:extLst>
+      <p:ext uri="{BB962C8B-B14F-4D97-AF65-F5344CB8AC3E}">
+        <p14:creationId xmlns:p14="http://schemas.microsoft.com/office/powerpoint/2010/main" val="2959286710"/>
+      </p:ext>
+    </p:extLst>
+  </p:cSld>
+  <p:clrMapOvr>
+    <a:masterClrMapping/>
+  </p:clrMapOvr>
+</p:sld>
+</file>
+
+<file path=ppt/slides/slide24.xml><?xml version="1.0" encoding="utf-8"?>
+<p:sld xmlns:a="http://schemas.openxmlformats.org/drawingml/2006/main" xmlns:r="http://schemas.openxmlformats.org/officeDocument/2006/relationships" xmlns:p="http://schemas.openxmlformats.org/presentationml/2006/main">
+  <p:cSld>
+    <p:spTree>
+      <p:nvGrpSpPr>
+        <p:cNvPr id="1" name=""/>
+        <p:cNvGrpSpPr/>
+        <p:nvPr/>
+      </p:nvGrpSpPr>
+      <p:grpSpPr>
+        <a:xfrm>
+          <a:off x="0" y="0"/>
+          <a:ext cx="0" cy="0"/>
+          <a:chOff x="0" y="0"/>
+          <a:chExt cx="0" cy="0"/>
+        </a:xfrm>
+      </p:grpSpPr>
+      <p:pic>
+        <p:nvPicPr>
+          <p:cNvPr id="7" name="Picture 6">
+            <a:extLst>
+              <a:ext uri="{FF2B5EF4-FFF2-40B4-BE49-F238E27FC236}">
+                <a16:creationId xmlns:a16="http://schemas.microsoft.com/office/drawing/2014/main" id="{41A90278-B252-2E4B-970D-2386C78C7D34}"/>
+              </a:ext>
+            </a:extLst>
+          </p:cNvPr>
+          <p:cNvPicPr>
+            <a:picLocks noChangeAspect="1"/>
+          </p:cNvPicPr>
+          <p:nvPr/>
+        </p:nvPicPr>
+        <p:blipFill>
+          <a:blip r:embed="rId2"/>
+          <a:stretch>
+            <a:fillRect/>
+          </a:stretch>
+        </p:blipFill>
+        <p:spPr>
+          <a:xfrm>
+            <a:off x="528115" y="993747"/>
+            <a:ext cx="8228571" cy="5760000"/>
+          </a:xfrm>
+          <a:prstGeom prst="rect">
+            <a:avLst/>
+          </a:prstGeom>
+        </p:spPr>
+      </p:pic>
+      <p:sp>
+        <p:nvSpPr>
+          <p:cNvPr id="2" name="Rectangle 1">
+            <a:extLst>
+              <a:ext uri="{FF2B5EF4-FFF2-40B4-BE49-F238E27FC236}">
+                <a16:creationId xmlns:a16="http://schemas.microsoft.com/office/drawing/2014/main" id="{D91655BD-4E82-BE49-A7CD-CA31E3AFCA3B}"/>
+              </a:ext>
+            </a:extLst>
+          </p:cNvPr>
+          <p:cNvSpPr/>
+          <p:nvPr/>
+        </p:nvSpPr>
+        <p:spPr>
+          <a:xfrm>
+            <a:off x="528115" y="409596"/>
+            <a:ext cx="5535554" cy="369332"/>
+          </a:xfrm>
+          <a:prstGeom prst="rect">
+            <a:avLst/>
+          </a:prstGeom>
+        </p:spPr>
+        <p:txBody>
+          <a:bodyPr wrap="none">
+            <a:spAutoFit/>
+          </a:bodyPr>
+          <a:lstStyle/>
+          <a:p>
+            <a:pPr marL="342900" indent="-342900">
+              <a:buFont typeface="+mj-lt"/>
+              <a:buAutoNum type="arabicPeriod" startAt="4"/>
+            </a:pPr>
+            <a:r>
+              <a:rPr lang="en-GB" b="1" dirty="0"/>
+              <a:t>Distributions of cline parameters – </a:t>
+            </a:r>
+            <a:r>
+              <a:rPr lang="en-GB" b="1" dirty="0" err="1"/>
+              <a:t>Var.Ex</a:t>
+            </a:r>
+            <a:r>
+              <a:rPr lang="en-GB" b="1" dirty="0"/>
+              <a:t> (GATK call)</a:t>
+            </a:r>
+          </a:p>
+        </p:txBody>
+      </p:sp>
+      <p:sp>
+        <p:nvSpPr>
+          <p:cNvPr id="3" name="TextBox 2">
+            <a:extLst>
+              <a:ext uri="{FF2B5EF4-FFF2-40B4-BE49-F238E27FC236}">
+                <a16:creationId xmlns:a16="http://schemas.microsoft.com/office/drawing/2014/main" id="{E3C4FFF0-6162-7545-8DED-E90631255C50}"/>
+              </a:ext>
+            </a:extLst>
+          </p:cNvPr>
+          <p:cNvSpPr txBox="1"/>
+          <p:nvPr/>
+        </p:nvSpPr>
+        <p:spPr>
+          <a:xfrm>
+            <a:off x="6709458" y="409596"/>
+            <a:ext cx="6001639" cy="369332"/>
+          </a:xfrm>
+          <a:prstGeom prst="rect">
+            <a:avLst/>
+          </a:prstGeom>
+          <a:noFill/>
+        </p:spPr>
+        <p:txBody>
+          <a:bodyPr wrap="square" rtlCol="0">
+            <a:spAutoFit/>
+          </a:bodyPr>
+          <a:lstStyle/>
+          <a:p>
+            <a:pPr marL="285750" indent="-285750">
+              <a:buFont typeface="Arial" panose="020B0604020202020204" pitchFamily="34" charset="0"/>
+              <a:buChar char="•"/>
+            </a:pPr>
+            <a:r>
+              <a:rPr lang="en-GB" dirty="0"/>
+              <a:t>Clinal INDELs and SNPs.</a:t>
+            </a:r>
+          </a:p>
+        </p:txBody>
+      </p:sp>
+      <p:sp>
+        <p:nvSpPr>
+          <p:cNvPr id="4" name="TextBox 3">
+            <a:extLst>
+              <a:ext uri="{FF2B5EF4-FFF2-40B4-BE49-F238E27FC236}">
+                <a16:creationId xmlns:a16="http://schemas.microsoft.com/office/drawing/2014/main" id="{3E27703C-140A-0642-910C-7B09247141B0}"/>
+              </a:ext>
+            </a:extLst>
+          </p:cNvPr>
+          <p:cNvSpPr txBox="1"/>
+          <p:nvPr/>
+        </p:nvSpPr>
+        <p:spPr>
+          <a:xfrm>
+            <a:off x="6709458" y="809081"/>
+            <a:ext cx="3292824" cy="369332"/>
+          </a:xfrm>
+          <a:prstGeom prst="rect">
+            <a:avLst/>
+          </a:prstGeom>
+          <a:noFill/>
+        </p:spPr>
+        <p:txBody>
+          <a:bodyPr wrap="none" rtlCol="0">
+            <a:spAutoFit/>
+          </a:bodyPr>
+          <a:lstStyle/>
+          <a:p>
+            <a:pPr marL="285750" indent="-285750">
+              <a:buFont typeface="Arial" panose="020B0604020202020204" pitchFamily="34" charset="0"/>
+              <a:buChar char="•"/>
+            </a:pPr>
+            <a:r>
+              <a:rPr lang="en-GB" dirty="0"/>
+              <a:t>All six hybrid zones combined.</a:t>
+            </a:r>
+          </a:p>
+        </p:txBody>
+      </p:sp>
+      <p:sp>
+        <p:nvSpPr>
+          <p:cNvPr id="11" name="TextBox 10">
+            <a:extLst>
+              <a:ext uri="{FF2B5EF4-FFF2-40B4-BE49-F238E27FC236}">
+                <a16:creationId xmlns:a16="http://schemas.microsoft.com/office/drawing/2014/main" id="{0204D076-8329-5844-9B89-47D809811C38}"/>
+              </a:ext>
+            </a:extLst>
+          </p:cNvPr>
+          <p:cNvSpPr txBox="1"/>
+          <p:nvPr/>
+        </p:nvSpPr>
+        <p:spPr>
+          <a:xfrm>
+            <a:off x="6709458" y="6168972"/>
+            <a:ext cx="4173551" cy="584775"/>
+          </a:xfrm>
+          <a:prstGeom prst="rect">
+            <a:avLst/>
+          </a:prstGeom>
+          <a:noFill/>
+        </p:spPr>
+        <p:txBody>
+          <a:bodyPr wrap="square" rtlCol="0">
+            <a:spAutoFit/>
+          </a:bodyPr>
+          <a:lstStyle/>
+          <a:p>
+            <a:r>
+              <a:rPr lang="en-GB" sz="1600" i="1"/>
+              <a:t>Figure 1</a:t>
+            </a:r>
+            <a:r>
+              <a:rPr lang="en-GB" sz="1600" i="1" dirty="0"/>
+              <a:t>2</a:t>
+            </a:r>
+            <a:r>
+              <a:rPr lang="en-GB" sz="1600" i="1"/>
+              <a:t>. </a:t>
+            </a:r>
+            <a:r>
+              <a:rPr lang="en-GB" sz="1600" i="1" dirty="0"/>
+              <a:t>Proportions of SNPs vs INDELs for a given range of variance explained (colours).</a:t>
+            </a:r>
+          </a:p>
+        </p:txBody>
+      </p:sp>
+    </p:spTree>
+    <p:extLst>
+      <p:ext uri="{BB962C8B-B14F-4D97-AF65-F5344CB8AC3E}">
+        <p14:creationId xmlns:p14="http://schemas.microsoft.com/office/powerpoint/2010/main" val="538201665"/>
       </p:ext>
     </p:extLst>
   </p:cSld>

</xml_diff>